<commit_message>
update electronic conductivity slides
</commit_message>
<xml_diff>
--- a/Extend_exp_electronic_conductivity/拓展实验pre.pptx
+++ b/Extend_exp_electronic_conductivity/拓展实验pre.pptx
@@ -6,16 +6,19 @@
   </p:sldMasterIdLst>
   <p:sldIdLst>
     <p:sldId id="256" r:id="rId2"/>
-    <p:sldId id="260" r:id="rId3"/>
-    <p:sldId id="257" r:id="rId4"/>
-    <p:sldId id="258" r:id="rId5"/>
-    <p:sldId id="259" r:id="rId6"/>
-    <p:sldId id="261" r:id="rId7"/>
+    <p:sldId id="262" r:id="rId3"/>
+    <p:sldId id="260" r:id="rId4"/>
+    <p:sldId id="257" r:id="rId5"/>
+    <p:sldId id="263" r:id="rId6"/>
+    <p:sldId id="258" r:id="rId7"/>
+    <p:sldId id="259" r:id="rId8"/>
+    <p:sldId id="265" r:id="rId9"/>
+    <p:sldId id="261" r:id="rId10"/>
   </p:sldIdLst>
   <p:sldSz cx="12192000" cy="6858000"/>
   <p:notesSz cx="6858000" cy="9144000"/>
   <p:custDataLst>
-    <p:tags r:id="rId8"/>
+    <p:tags r:id="rId11"/>
   </p:custDataLst>
   <p:defaultTextStyle>
     <a:defPPr>
@@ -112,6 +115,11 @@
       </a:defRPr>
     </a:lvl9pPr>
   </p:defaultTextStyle>
+  <p:extLst>
+    <p:ext uri="{EFAFB233-063F-42B5-8137-9DF3F51BA10A}">
+      <p15:sldGuideLst xmlns:p15="http://schemas.microsoft.com/office/powerpoint/2012/main"/>
+    </p:ext>
+  </p:extLst>
 </p:presentation>
 </file>
 
@@ -3404,7 +3412,7 @@
           <a:graphicData uri="http://schemas.openxmlformats.org/presentationml/2006/ole">
             <mc:AlternateContent xmlns:mc="http://schemas.openxmlformats.org/markup-compatibility/2006">
               <mc:Choice xmlns:v="urn:schemas-microsoft-com:vml" Requires="v">
-                <p:oleObj spid="_x0000_s1049" name="think-cell Slide" r:id="rId5" imgW="395" imgH="392" progId="TCLayout.ActiveDocument.1">
+                <p:oleObj spid="_x0000_s1060" name="think-cell Slide" r:id="rId5" imgW="395" imgH="392" progId="TCLayout.ActiveDocument.1">
                   <p:embed/>
                 </p:oleObj>
               </mc:Choice>
@@ -3670,7 +3678,7 @@
             </p:custDataLst>
             <p:extLst>
               <p:ext uri="{D42A27DB-BD31-4B8C-83A1-F6EECF244321}">
-                <p14:modId xmlns:p14="http://schemas.microsoft.com/office/powerpoint/2010/main" val="1969524768"/>
+                <p14:modId xmlns:p14="http://schemas.microsoft.com/office/powerpoint/2010/main" val="1780449136"/>
               </p:ext>
             </p:extLst>
           </p:nvPr>
@@ -3683,7 +3691,1185 @@
           <a:graphicData uri="http://schemas.openxmlformats.org/presentationml/2006/ole">
             <mc:AlternateContent xmlns:mc="http://schemas.openxmlformats.org/markup-compatibility/2006">
               <mc:Choice xmlns:v="urn:schemas-microsoft-com:vml" Requires="v">
-                <p:oleObj spid="_x0000_s5140" name="think-cell Slide" r:id="rId4" imgW="395" imgH="392" progId="TCLayout.ActiveDocument.1">
+                <p:oleObj spid="_x0000_s6156" name="think-cell Slide" r:id="rId5" imgW="395" imgH="392" progId="TCLayout.ActiveDocument.1">
+                  <p:embed/>
+                </p:oleObj>
+              </mc:Choice>
+              <mc:Fallback>
+                <p:oleObj name="think-cell Slide" r:id="rId5" imgW="395" imgH="392" progId="TCLayout.ActiveDocument.1">
+                  <p:embed/>
+                  <p:pic>
+                    <p:nvPicPr>
+                      <p:cNvPr id="0" name=""/>
+                      <p:cNvPicPr/>
+                      <p:nvPr/>
+                    </p:nvPicPr>
+                    <p:blipFill>
+                      <a:blip r:embed="rId6"/>
+                      <a:stretch>
+                        <a:fillRect/>
+                      </a:stretch>
+                    </p:blipFill>
+                    <p:spPr>
+                      <a:xfrm>
+                        <a:off x="1588" y="1588"/>
+                        <a:ext cx="1588" cy="1588"/>
+                      </a:xfrm>
+                      <a:prstGeom prst="rect">
+                        <a:avLst/>
+                      </a:prstGeom>
+                    </p:spPr>
+                  </p:pic>
+                </p:oleObj>
+              </mc:Fallback>
+            </mc:AlternateContent>
+          </a:graphicData>
+        </a:graphic>
+      </p:graphicFrame>
+      <p:sp>
+        <p:nvSpPr>
+          <p:cNvPr id="5" name="矩形 4" hidden="1"/>
+          <p:cNvSpPr/>
+          <p:nvPr>
+            <p:custDataLst>
+              <p:tags r:id="rId3"/>
+            </p:custDataLst>
+          </p:nvPr>
+        </p:nvSpPr>
+        <p:spPr>
+          <a:xfrm>
+            <a:off x="0" y="0"/>
+            <a:ext cx="158750" cy="158750"/>
+          </a:xfrm>
+          <a:prstGeom prst="rect">
+            <a:avLst/>
+          </a:prstGeom>
+        </p:spPr>
+        <p:style>
+          <a:lnRef idx="2">
+            <a:schemeClr val="accent1">
+              <a:shade val="50000"/>
+            </a:schemeClr>
+          </a:lnRef>
+          <a:fillRef idx="1">
+            <a:schemeClr val="accent1"/>
+          </a:fillRef>
+          <a:effectRef idx="0">
+            <a:schemeClr val="accent1"/>
+          </a:effectRef>
+          <a:fontRef idx="minor">
+            <a:schemeClr val="lt1"/>
+          </a:fontRef>
+        </p:style>
+        <p:txBody>
+          <a:bodyPr wrap="none" lIns="0" tIns="0" rIns="0" bIns="0" rtlCol="0" anchor="ctr"/>
+          <a:lstStyle/>
+          <a:p>
+            <a:pPr algn="ctr">
+              <a:lnSpc>
+                <a:spcPct val="90000"/>
+              </a:lnSpc>
+              <a:spcBef>
+                <a:spcPct val="0"/>
+              </a:spcBef>
+              <a:spcAft>
+                <a:spcPct val="0"/>
+              </a:spcAft>
+            </a:pPr>
+            <a:endParaRPr lang="en-US" altLang="zh-CN" sz="3600" dirty="0">
+              <a:latin typeface="Corbel" panose="020B0503020204020204" pitchFamily="34" charset="0"/>
+              <a:ea typeface="幼圆" panose="02010509060101010101" pitchFamily="49" charset="-122"/>
+              <a:cs typeface="+mj-cs"/>
+              <a:sym typeface="Corbel" panose="020B0503020204020204" pitchFamily="34" charset="0"/>
+            </a:endParaRPr>
+          </a:p>
+        </p:txBody>
+      </p:sp>
+      <p:sp>
+        <p:nvSpPr>
+          <p:cNvPr id="2" name="标题 1"/>
+          <p:cNvSpPr>
+            <a:spLocks noGrp="1"/>
+          </p:cNvSpPr>
+          <p:nvPr>
+            <p:ph type="title"/>
+          </p:nvPr>
+        </p:nvSpPr>
+        <p:spPr/>
+        <p:txBody>
+          <a:bodyPr>
+            <a:normAutofit/>
+          </a:bodyPr>
+          <a:lstStyle/>
+          <a:p>
+            <a:r>
+              <a:rPr lang="zh-CN" altLang="en-US" sz="2800" b="1" dirty="0" smtClean="0"/>
+              <a:t>实验目的</a:t>
+            </a:r>
+            <a:endParaRPr lang="zh-CN" altLang="en-US" sz="2800" b="1" dirty="0"/>
+          </a:p>
+        </p:txBody>
+      </p:sp>
+      <p:sp>
+        <p:nvSpPr>
+          <p:cNvPr id="3" name="内容占位符 2"/>
+          <p:cNvSpPr>
+            <a:spLocks noGrp="1"/>
+          </p:cNvSpPr>
+          <p:nvPr>
+            <p:ph idx="1"/>
+          </p:nvPr>
+        </p:nvSpPr>
+        <p:spPr/>
+        <p:txBody>
+          <a:bodyPr/>
+          <a:lstStyle/>
+          <a:p>
+            <a:r>
+              <a:rPr lang="zh-CN" altLang="en-US" dirty="0" smtClean="0"/>
+              <a:t>掌握</a:t>
+            </a:r>
+            <a:r>
+              <a:rPr lang="zh-CN" altLang="en-US" dirty="0"/>
+              <a:t>电导法</a:t>
+            </a:r>
+            <a:r>
+              <a:rPr lang="zh-CN" altLang="en-US" dirty="0" smtClean="0"/>
+              <a:t>测定电解质溶液的电导率</a:t>
+            </a:r>
+            <a:endParaRPr lang="en-US" altLang="zh-CN" dirty="0" smtClean="0"/>
+          </a:p>
+          <a:p>
+            <a:r>
+              <a:rPr lang="zh-CN" altLang="en-US" dirty="0" smtClean="0"/>
+              <a:t>应用难</a:t>
+            </a:r>
+            <a:r>
+              <a:rPr lang="zh-CN" altLang="en-US" dirty="0"/>
+              <a:t>溶</a:t>
+            </a:r>
+            <a:r>
+              <a:rPr lang="zh-CN" altLang="en-US" dirty="0" smtClean="0"/>
+              <a:t>盐电导率推算其摩尔生成热</a:t>
+            </a:r>
+            <a:r>
+              <a:rPr lang="en-US" altLang="zh-CN" dirty="0" smtClean="0"/>
+              <a:t>/</a:t>
+            </a:r>
+            <a:r>
+              <a:rPr lang="zh-CN" altLang="en-US" dirty="0" smtClean="0"/>
+              <a:t>摩尔生成焓</a:t>
+            </a:r>
+            <a:endParaRPr lang="en-US" altLang="zh-CN" dirty="0" smtClean="0"/>
+          </a:p>
+          <a:p>
+            <a:r>
+              <a:rPr lang="zh-CN" altLang="en-US" dirty="0" smtClean="0"/>
+              <a:t>了解</a:t>
+            </a:r>
+            <a:r>
+              <a:rPr lang="zh-CN" altLang="en-US" dirty="0"/>
+              <a:t>电导率的</a:t>
+            </a:r>
+            <a:r>
+              <a:rPr lang="zh-CN" altLang="en-US" dirty="0" smtClean="0"/>
+              <a:t>应用</a:t>
+            </a:r>
+            <a:endParaRPr lang="en-US" altLang="zh-CN" dirty="0" smtClean="0"/>
+          </a:p>
+        </p:txBody>
+      </p:sp>
+    </p:spTree>
+    <p:extLst>
+      <p:ext uri="{BB962C8B-B14F-4D97-AF65-F5344CB8AC3E}">
+        <p14:creationId xmlns:p14="http://schemas.microsoft.com/office/powerpoint/2010/main" val="4263444033"/>
+      </p:ext>
+    </p:extLst>
+  </p:cSld>
+  <p:clrMapOvr>
+    <a:masterClrMapping/>
+  </p:clrMapOvr>
+</p:sld>
+</file>
+
+<file path=ppt/slides/slide3.xml><?xml version="1.0" encoding="utf-8"?>
+<p:sld xmlns:a="http://schemas.openxmlformats.org/drawingml/2006/main" xmlns:r="http://schemas.openxmlformats.org/officeDocument/2006/relationships" xmlns:p="http://schemas.openxmlformats.org/presentationml/2006/main">
+  <p:cSld>
+    <p:spTree>
+      <p:nvGrpSpPr>
+        <p:cNvPr id="1" name=""/>
+        <p:cNvGrpSpPr/>
+        <p:nvPr/>
+      </p:nvGrpSpPr>
+      <p:grpSpPr>
+        <a:xfrm>
+          <a:off x="0" y="0"/>
+          <a:ext cx="0" cy="0"/>
+          <a:chOff x="0" y="0"/>
+          <a:chExt cx="0" cy="0"/>
+        </a:xfrm>
+      </p:grpSpPr>
+      <p:graphicFrame>
+        <p:nvGraphicFramePr>
+          <p:cNvPr id="4" name="对象 3" hidden="1"/>
+          <p:cNvGraphicFramePr>
+            <a:graphicFrameLocks noChangeAspect="1"/>
+          </p:cNvGraphicFramePr>
+          <p:nvPr>
+            <p:custDataLst>
+              <p:tags r:id="rId2"/>
+            </p:custDataLst>
+            <p:extLst>
+              <p:ext uri="{D42A27DB-BD31-4B8C-83A1-F6EECF244321}">
+                <p14:modId xmlns:p14="http://schemas.microsoft.com/office/powerpoint/2010/main" val="2292938394"/>
+              </p:ext>
+            </p:extLst>
+          </p:nvPr>
+        </p:nvGraphicFramePr>
+        <p:xfrm>
+          <a:off x="1588" y="1588"/>
+          <a:ext cx="1588" cy="1588"/>
+        </p:xfrm>
+        <a:graphic>
+          <a:graphicData uri="http://schemas.openxmlformats.org/presentationml/2006/ole">
+            <mc:AlternateContent xmlns:mc="http://schemas.openxmlformats.org/markup-compatibility/2006">
+              <mc:Choice xmlns:v="urn:schemas-microsoft-com:vml" Requires="v">
+                <p:oleObj spid="_x0000_s5151" name="think-cell Slide" r:id="rId5" imgW="395" imgH="392" progId="TCLayout.ActiveDocument.1">
+                  <p:embed/>
+                </p:oleObj>
+              </mc:Choice>
+              <mc:Fallback>
+                <p:oleObj name="think-cell Slide" r:id="rId5" imgW="395" imgH="392" progId="TCLayout.ActiveDocument.1">
+                  <p:embed/>
+                  <p:pic>
+                    <p:nvPicPr>
+                      <p:cNvPr id="0" name=""/>
+                      <p:cNvPicPr/>
+                      <p:nvPr/>
+                    </p:nvPicPr>
+                    <p:blipFill>
+                      <a:blip r:embed="rId6"/>
+                      <a:stretch>
+                        <a:fillRect/>
+                      </a:stretch>
+                    </p:blipFill>
+                    <p:spPr>
+                      <a:xfrm>
+                        <a:off x="1588" y="1588"/>
+                        <a:ext cx="1588" cy="1588"/>
+                      </a:xfrm>
+                      <a:prstGeom prst="rect">
+                        <a:avLst/>
+                      </a:prstGeom>
+                    </p:spPr>
+                  </p:pic>
+                </p:oleObj>
+              </mc:Fallback>
+            </mc:AlternateContent>
+          </a:graphicData>
+        </a:graphic>
+      </p:graphicFrame>
+      <p:sp>
+        <p:nvSpPr>
+          <p:cNvPr id="5" name="矩形 4" hidden="1"/>
+          <p:cNvSpPr/>
+          <p:nvPr>
+            <p:custDataLst>
+              <p:tags r:id="rId3"/>
+            </p:custDataLst>
+          </p:nvPr>
+        </p:nvSpPr>
+        <p:spPr>
+          <a:xfrm>
+            <a:off x="0" y="0"/>
+            <a:ext cx="158750" cy="158750"/>
+          </a:xfrm>
+          <a:prstGeom prst="rect">
+            <a:avLst/>
+          </a:prstGeom>
+        </p:spPr>
+        <p:style>
+          <a:lnRef idx="2">
+            <a:schemeClr val="accent1">
+              <a:shade val="50000"/>
+            </a:schemeClr>
+          </a:lnRef>
+          <a:fillRef idx="1">
+            <a:schemeClr val="accent1"/>
+          </a:fillRef>
+          <a:effectRef idx="0">
+            <a:schemeClr val="accent1"/>
+          </a:effectRef>
+          <a:fontRef idx="minor">
+            <a:schemeClr val="lt1"/>
+          </a:fontRef>
+        </p:style>
+        <p:txBody>
+          <a:bodyPr wrap="none" lIns="0" tIns="0" rIns="0" bIns="0" rtlCol="0" anchor="ctr"/>
+          <a:lstStyle/>
+          <a:p>
+            <a:pPr algn="ctr">
+              <a:lnSpc>
+                <a:spcPct val="90000"/>
+              </a:lnSpc>
+              <a:spcBef>
+                <a:spcPct val="0"/>
+              </a:spcBef>
+              <a:spcAft>
+                <a:spcPct val="0"/>
+              </a:spcAft>
+            </a:pPr>
+            <a:endParaRPr lang="en-US" altLang="zh-CN" sz="2800" b="1" dirty="0">
+              <a:latin typeface="Corbel" panose="020B0503020204020204" pitchFamily="34" charset="0"/>
+              <a:ea typeface="幼圆" panose="02010509060101010101" pitchFamily="49" charset="-122"/>
+              <a:cs typeface="+mj-cs"/>
+              <a:sym typeface="Corbel" panose="020B0503020204020204" pitchFamily="34" charset="0"/>
+            </a:endParaRPr>
+          </a:p>
+        </p:txBody>
+      </p:sp>
+      <p:sp>
+        <p:nvSpPr>
+          <p:cNvPr id="2" name="标题 1"/>
+          <p:cNvSpPr>
+            <a:spLocks noGrp="1"/>
+          </p:cNvSpPr>
+          <p:nvPr>
+            <p:ph type="title"/>
+          </p:nvPr>
+        </p:nvSpPr>
+        <p:spPr/>
+        <p:txBody>
+          <a:bodyPr/>
+          <a:lstStyle/>
+          <a:p>
+            <a:r>
+              <a:rPr lang="zh-CN" altLang="en-US" sz="2400" dirty="0"/>
+              <a:t>实验原理</a:t>
+            </a:r>
+            <a:r>
+              <a:rPr lang="en-US" altLang="zh-CN" sz="2400" dirty="0"/>
+              <a:t/>
+            </a:r>
+            <a:br>
+              <a:rPr lang="en-US" altLang="zh-CN" sz="2400" dirty="0"/>
+            </a:br>
+            <a:r>
+              <a:rPr lang="en-US" altLang="zh-CN" dirty="0"/>
+              <a:t/>
+            </a:r>
+            <a:br>
+              <a:rPr lang="en-US" altLang="zh-CN" dirty="0"/>
+            </a:br>
+            <a:r>
+              <a:rPr lang="en-US" altLang="zh-CN" dirty="0" smtClean="0"/>
+              <a:t>1. </a:t>
+            </a:r>
+            <a:r>
+              <a:rPr lang="zh-CN" altLang="en-US" sz="2800" dirty="0" smtClean="0"/>
+              <a:t>摩尔</a:t>
+            </a:r>
+            <a:r>
+              <a:rPr lang="zh-CN" altLang="en-US" sz="2800" b="1" dirty="0" smtClean="0"/>
+              <a:t>电导率</a:t>
+            </a:r>
+            <a:r>
+              <a:rPr lang="en-US" altLang="zh-CN" sz="2800" b="1" dirty="0" smtClean="0"/>
+              <a:t/>
+            </a:r>
+            <a:br>
+              <a:rPr lang="en-US" altLang="zh-CN" sz="2800" b="1" dirty="0" smtClean="0"/>
+            </a:br>
+            <a:r>
+              <a:rPr lang="en-US" altLang="zh-CN" sz="2800" b="1" dirty="0" smtClean="0"/>
+              <a:t>2. </a:t>
+            </a:r>
+            <a:r>
+              <a:rPr lang="zh-CN" altLang="en-US" sz="2800" b="1" dirty="0" smtClean="0"/>
+              <a:t>溶度积</a:t>
+            </a:r>
+            <a:endParaRPr lang="zh-CN" altLang="en-US" sz="2800" dirty="0"/>
+          </a:p>
+        </p:txBody>
+      </p:sp>
+      <p:sp>
+        <p:nvSpPr>
+          <p:cNvPr id="3" name="内容占位符 2"/>
+          <p:cNvSpPr>
+            <a:spLocks noGrp="1"/>
+          </p:cNvSpPr>
+          <p:nvPr>
+            <p:ph idx="1"/>
+          </p:nvPr>
+        </p:nvSpPr>
+        <p:spPr/>
+        <p:txBody>
+          <a:bodyPr/>
+          <a:lstStyle/>
+          <a:p>
+            <a:endParaRPr lang="en-US" altLang="zh-CN" dirty="0" smtClean="0"/>
+          </a:p>
+          <a:p>
+            <a:endParaRPr lang="en-US" altLang="zh-CN" dirty="0" smtClean="0"/>
+          </a:p>
+          <a:p>
+            <a:r>
+              <a:rPr lang="zh-CN" altLang="en-US" dirty="0" smtClean="0"/>
+              <a:t>电解质电导率</a:t>
+            </a:r>
+            <a:r>
+              <a:rPr lang="en-US" altLang="zh-CN" dirty="0" smtClean="0"/>
+              <a:t>:</a:t>
+            </a:r>
+            <a:endParaRPr lang="en-US" altLang="zh-CN" dirty="0"/>
+          </a:p>
+          <a:p>
+            <a:endParaRPr lang="en-US" altLang="zh-CN" dirty="0" smtClean="0"/>
+          </a:p>
+          <a:p>
+            <a:r>
+              <a:rPr lang="zh-CN" altLang="en-US" dirty="0" smtClean="0"/>
+              <a:t>摩尔电导率</a:t>
+            </a:r>
+            <a:r>
+              <a:rPr lang="en-US" altLang="zh-CN" dirty="0" smtClean="0"/>
+              <a:t>:</a:t>
+            </a:r>
+            <a:endParaRPr lang="en-US" altLang="zh-CN" dirty="0"/>
+          </a:p>
+          <a:p>
+            <a:pPr marL="0" indent="0">
+              <a:buNone/>
+            </a:pPr>
+            <a:endParaRPr lang="en-US" altLang="zh-CN" dirty="0"/>
+          </a:p>
+          <a:p>
+            <a:r>
+              <a:rPr lang="zh-CN" altLang="en-US" dirty="0" smtClean="0"/>
+              <a:t>难</a:t>
+            </a:r>
+            <a:r>
+              <a:rPr lang="zh-CN" altLang="en-US" dirty="0"/>
+              <a:t>溶盐摩尔电导率</a:t>
+            </a:r>
+            <a:r>
+              <a:rPr lang="en-US" altLang="zh-CN" dirty="0"/>
+              <a:t>:</a:t>
+            </a:r>
+          </a:p>
+          <a:p>
+            <a:pPr marL="0" indent="0">
+              <a:buNone/>
+            </a:pPr>
+            <a:endParaRPr lang="en-US" altLang="zh-CN" dirty="0" smtClean="0"/>
+          </a:p>
+          <a:p>
+            <a:pPr marL="0" indent="0">
+              <a:buNone/>
+            </a:pPr>
+            <a:endParaRPr lang="en-US" altLang="zh-CN" dirty="0"/>
+          </a:p>
+          <a:p>
+            <a:pPr marL="0" indent="0">
+              <a:buNone/>
+            </a:pPr>
+            <a:endParaRPr lang="en-US" altLang="zh-CN" dirty="0" smtClean="0"/>
+          </a:p>
+          <a:p>
+            <a:pPr marL="0" indent="0">
+              <a:buNone/>
+            </a:pPr>
+            <a:endParaRPr lang="en-US" altLang="zh-CN" dirty="0"/>
+          </a:p>
+          <a:p>
+            <a:r>
+              <a:rPr lang="zh-CN" altLang="en-US" dirty="0"/>
+              <a:t>难溶盐溶度积</a:t>
+            </a:r>
+            <a:r>
+              <a:rPr lang="en-US" altLang="zh-CN" dirty="0"/>
+              <a:t>:</a:t>
+            </a:r>
+          </a:p>
+          <a:p>
+            <a:pPr marL="0" indent="0">
+              <a:buNone/>
+            </a:pPr>
+            <a:endParaRPr lang="en-US" altLang="zh-CN" dirty="0" smtClean="0"/>
+          </a:p>
+          <a:p>
+            <a:pPr marL="0" indent="0">
+              <a:buNone/>
+            </a:pPr>
+            <a:endParaRPr lang="en-US" altLang="zh-CN" dirty="0" smtClean="0"/>
+          </a:p>
+          <a:p>
+            <a:pPr marL="0" indent="0">
+              <a:buNone/>
+            </a:pPr>
+            <a:endParaRPr lang="en-US" altLang="zh-CN" dirty="0"/>
+          </a:p>
+          <a:p>
+            <a:endParaRPr lang="zh-CN" altLang="en-US" dirty="0"/>
+          </a:p>
+        </p:txBody>
+      </p:sp>
+      <p:pic>
+        <p:nvPicPr>
+          <p:cNvPr id="9" name="图片 8"/>
+          <p:cNvPicPr>
+            <a:picLocks noChangeAspect="1"/>
+          </p:cNvPicPr>
+          <p:nvPr/>
+        </p:nvPicPr>
+        <p:blipFill>
+          <a:blip r:embed="rId7"/>
+          <a:stretch>
+            <a:fillRect/>
+          </a:stretch>
+        </p:blipFill>
+        <p:spPr>
+          <a:xfrm>
+            <a:off x="6758813" y="1461916"/>
+            <a:ext cx="1794059" cy="765298"/>
+          </a:xfrm>
+          <a:prstGeom prst="rect">
+            <a:avLst/>
+          </a:prstGeom>
+        </p:spPr>
+      </p:pic>
+      <p:pic>
+        <p:nvPicPr>
+          <p:cNvPr id="10" name="图片 9"/>
+          <p:cNvPicPr>
+            <a:picLocks noChangeAspect="1"/>
+          </p:cNvPicPr>
+          <p:nvPr/>
+        </p:nvPicPr>
+        <p:blipFill>
+          <a:blip r:embed="rId8"/>
+          <a:stretch>
+            <a:fillRect/>
+          </a:stretch>
+        </p:blipFill>
+        <p:spPr>
+          <a:xfrm>
+            <a:off x="6758813" y="2511694"/>
+            <a:ext cx="1869313" cy="558645"/>
+          </a:xfrm>
+          <a:prstGeom prst="rect">
+            <a:avLst/>
+          </a:prstGeom>
+        </p:spPr>
+      </p:pic>
+      <p:pic>
+        <p:nvPicPr>
+          <p:cNvPr id="12" name="图片 11"/>
+          <p:cNvPicPr>
+            <a:picLocks noChangeAspect="1"/>
+          </p:cNvPicPr>
+          <p:nvPr/>
+        </p:nvPicPr>
+        <p:blipFill>
+          <a:blip r:embed="rId9"/>
+          <a:stretch>
+            <a:fillRect/>
+          </a:stretch>
+        </p:blipFill>
+        <p:spPr>
+          <a:xfrm>
+            <a:off x="6858424" y="3070339"/>
+            <a:ext cx="2648188" cy="1570959"/>
+          </a:xfrm>
+          <a:prstGeom prst="rect">
+            <a:avLst/>
+          </a:prstGeom>
+        </p:spPr>
+      </p:pic>
+      <p:pic>
+        <p:nvPicPr>
+          <p:cNvPr id="13" name="图片 12"/>
+          <p:cNvPicPr>
+            <a:picLocks noChangeAspect="1"/>
+          </p:cNvPicPr>
+          <p:nvPr/>
+        </p:nvPicPr>
+        <p:blipFill>
+          <a:blip r:embed="rId10"/>
+          <a:stretch>
+            <a:fillRect/>
+          </a:stretch>
+        </p:blipFill>
+        <p:spPr>
+          <a:xfrm>
+            <a:off x="6858424" y="4641298"/>
+            <a:ext cx="2384717" cy="1742203"/>
+          </a:xfrm>
+          <a:prstGeom prst="rect">
+            <a:avLst/>
+          </a:prstGeom>
+        </p:spPr>
+      </p:pic>
+      <p:pic>
+        <p:nvPicPr>
+          <p:cNvPr id="14" name="图片 13"/>
+          <p:cNvPicPr>
+            <a:picLocks noChangeAspect="1"/>
+          </p:cNvPicPr>
+          <p:nvPr/>
+        </p:nvPicPr>
+        <p:blipFill>
+          <a:blip r:embed="rId11"/>
+          <a:stretch>
+            <a:fillRect/>
+          </a:stretch>
+        </p:blipFill>
+        <p:spPr>
+          <a:xfrm>
+            <a:off x="6758813" y="862562"/>
+            <a:ext cx="3009553" cy="480516"/>
+          </a:xfrm>
+          <a:prstGeom prst="rect">
+            <a:avLst/>
+          </a:prstGeom>
+        </p:spPr>
+      </p:pic>
+    </p:spTree>
+    <p:extLst>
+      <p:ext uri="{BB962C8B-B14F-4D97-AF65-F5344CB8AC3E}">
+        <p14:creationId xmlns:p14="http://schemas.microsoft.com/office/powerpoint/2010/main" val="3677243077"/>
+      </p:ext>
+    </p:extLst>
+  </p:cSld>
+  <p:clrMapOvr>
+    <a:masterClrMapping/>
+  </p:clrMapOvr>
+</p:sld>
+</file>
+
+<file path=ppt/slides/slide4.xml><?xml version="1.0" encoding="utf-8"?>
+<p:sld xmlns:a="http://schemas.openxmlformats.org/drawingml/2006/main" xmlns:r="http://schemas.openxmlformats.org/officeDocument/2006/relationships" xmlns:p="http://schemas.openxmlformats.org/presentationml/2006/main">
+  <p:cSld>
+    <p:spTree>
+      <p:nvGrpSpPr>
+        <p:cNvPr id="1" name=""/>
+        <p:cNvGrpSpPr/>
+        <p:nvPr/>
+      </p:nvGrpSpPr>
+      <p:grpSpPr>
+        <a:xfrm>
+          <a:off x="0" y="0"/>
+          <a:ext cx="0" cy="0"/>
+          <a:chOff x="0" y="0"/>
+          <a:chExt cx="0" cy="0"/>
+        </a:xfrm>
+      </p:grpSpPr>
+      <p:graphicFrame>
+        <p:nvGraphicFramePr>
+          <p:cNvPr id="4" name="对象 3" hidden="1"/>
+          <p:cNvGraphicFramePr>
+            <a:graphicFrameLocks noChangeAspect="1"/>
+          </p:cNvGraphicFramePr>
+          <p:nvPr>
+            <p:custDataLst>
+              <p:tags r:id="rId2"/>
+            </p:custDataLst>
+            <p:extLst>
+              <p:ext uri="{D42A27DB-BD31-4B8C-83A1-F6EECF244321}">
+                <p14:modId xmlns:p14="http://schemas.microsoft.com/office/powerpoint/2010/main" val="2399827907"/>
+              </p:ext>
+            </p:extLst>
+          </p:nvPr>
+        </p:nvGraphicFramePr>
+        <p:xfrm>
+          <a:off x="1588" y="1588"/>
+          <a:ext cx="1588" cy="1588"/>
+        </p:xfrm>
+        <a:graphic>
+          <a:graphicData uri="http://schemas.openxmlformats.org/presentationml/2006/ole">
+            <mc:AlternateContent xmlns:mc="http://schemas.openxmlformats.org/markup-compatibility/2006">
+              <mc:Choice xmlns:v="urn:schemas-microsoft-com:vml" Requires="v">
+                <p:oleObj spid="_x0000_s2083" name="think-cell Slide" r:id="rId5" imgW="395" imgH="392" progId="TCLayout.ActiveDocument.1">
+                  <p:embed/>
+                </p:oleObj>
+              </mc:Choice>
+              <mc:Fallback>
+                <p:oleObj name="think-cell Slide" r:id="rId5" imgW="395" imgH="392" progId="TCLayout.ActiveDocument.1">
+                  <p:embed/>
+                  <p:pic>
+                    <p:nvPicPr>
+                      <p:cNvPr id="0" name=""/>
+                      <p:cNvPicPr/>
+                      <p:nvPr/>
+                    </p:nvPicPr>
+                    <p:blipFill>
+                      <a:blip r:embed="rId6"/>
+                      <a:stretch>
+                        <a:fillRect/>
+                      </a:stretch>
+                    </p:blipFill>
+                    <p:spPr>
+                      <a:xfrm>
+                        <a:off x="1588" y="1588"/>
+                        <a:ext cx="1588" cy="1588"/>
+                      </a:xfrm>
+                      <a:prstGeom prst="rect">
+                        <a:avLst/>
+                      </a:prstGeom>
+                    </p:spPr>
+                  </p:pic>
+                </p:oleObj>
+              </mc:Fallback>
+            </mc:AlternateContent>
+          </a:graphicData>
+        </a:graphic>
+      </p:graphicFrame>
+      <p:sp>
+        <p:nvSpPr>
+          <p:cNvPr id="6" name="矩形 5" hidden="1"/>
+          <p:cNvSpPr/>
+          <p:nvPr>
+            <p:custDataLst>
+              <p:tags r:id="rId3"/>
+            </p:custDataLst>
+          </p:nvPr>
+        </p:nvSpPr>
+        <p:spPr>
+          <a:xfrm>
+            <a:off x="0" y="0"/>
+            <a:ext cx="158750" cy="158750"/>
+          </a:xfrm>
+          <a:prstGeom prst="rect">
+            <a:avLst/>
+          </a:prstGeom>
+        </p:spPr>
+        <p:style>
+          <a:lnRef idx="2">
+            <a:schemeClr val="accent1">
+              <a:shade val="50000"/>
+            </a:schemeClr>
+          </a:lnRef>
+          <a:fillRef idx="1">
+            <a:schemeClr val="accent1"/>
+          </a:fillRef>
+          <a:effectRef idx="0">
+            <a:schemeClr val="accent1"/>
+          </a:effectRef>
+          <a:fontRef idx="minor">
+            <a:schemeClr val="lt1"/>
+          </a:fontRef>
+        </p:style>
+        <p:txBody>
+          <a:bodyPr wrap="none" lIns="0" tIns="0" rIns="0" bIns="0" rtlCol="0" anchor="ctr"/>
+          <a:lstStyle/>
+          <a:p>
+            <a:pPr algn="ctr">
+              <a:lnSpc>
+                <a:spcPct val="90000"/>
+              </a:lnSpc>
+              <a:spcBef>
+                <a:spcPct val="0"/>
+              </a:spcBef>
+              <a:spcAft>
+                <a:spcPct val="0"/>
+              </a:spcAft>
+            </a:pPr>
+            <a:endParaRPr lang="en-US" altLang="zh-CN" sz="2800" b="1" dirty="0">
+              <a:latin typeface="Corbel" panose="020B0503020204020204" pitchFamily="34" charset="0"/>
+              <a:ea typeface="幼圆" panose="02010509060101010101" pitchFamily="49" charset="-122"/>
+              <a:cs typeface="+mj-cs"/>
+              <a:sym typeface="Corbel" panose="020B0503020204020204" pitchFamily="34" charset="0"/>
+            </a:endParaRPr>
+          </a:p>
+        </p:txBody>
+      </p:sp>
+      <p:sp>
+        <p:nvSpPr>
+          <p:cNvPr id="2" name="标题 1"/>
+          <p:cNvSpPr>
+            <a:spLocks noGrp="1"/>
+          </p:cNvSpPr>
+          <p:nvPr>
+            <p:ph type="title"/>
+          </p:nvPr>
+        </p:nvSpPr>
+        <p:spPr/>
+        <p:txBody>
+          <a:bodyPr/>
+          <a:lstStyle/>
+          <a:p>
+            <a:r>
+              <a:rPr lang="zh-CN" altLang="en-US" sz="2400" dirty="0"/>
+              <a:t>实验</a:t>
+            </a:r>
+            <a:r>
+              <a:rPr lang="zh-CN" altLang="en-US" sz="2400" dirty="0" smtClean="0"/>
+              <a:t>原理</a:t>
+            </a:r>
+            <a:r>
+              <a:rPr lang="en-US" altLang="zh-CN" sz="2400" dirty="0" smtClean="0"/>
+              <a:t/>
+            </a:r>
+            <a:br>
+              <a:rPr lang="en-US" altLang="zh-CN" sz="2400" dirty="0" smtClean="0"/>
+            </a:br>
+            <a:r>
+              <a:rPr lang="en-US" altLang="zh-CN" dirty="0"/>
+              <a:t/>
+            </a:r>
+            <a:br>
+              <a:rPr lang="en-US" altLang="zh-CN" dirty="0"/>
+            </a:br>
+            <a:r>
+              <a:rPr lang="en-US" altLang="zh-CN" dirty="0" smtClean="0"/>
+              <a:t>3. </a:t>
+            </a:r>
+            <a:r>
+              <a:rPr lang="zh-CN" altLang="en-US" sz="2800" b="1" dirty="0" smtClean="0"/>
+              <a:t>热力学平衡</a:t>
+            </a:r>
+            <a:r>
+              <a:rPr lang="en-US" altLang="zh-CN" sz="2800" b="1" dirty="0" smtClean="0"/>
+              <a:t/>
+            </a:r>
+            <a:br>
+              <a:rPr lang="en-US" altLang="zh-CN" sz="2800" b="1" dirty="0" smtClean="0"/>
+            </a:br>
+            <a:r>
+              <a:rPr lang="en-US" altLang="zh-CN" sz="2800" b="1" dirty="0" smtClean="0"/>
+              <a:t>4. </a:t>
+            </a:r>
+            <a:r>
+              <a:rPr lang="zh-CN" altLang="en-US" sz="2800" b="1" dirty="0" smtClean="0"/>
+              <a:t>实验思路与数据处理</a:t>
+            </a:r>
+            <a:endParaRPr lang="zh-CN" altLang="en-US" sz="2800" b="1" dirty="0"/>
+          </a:p>
+        </p:txBody>
+      </p:sp>
+      <p:sp>
+        <p:nvSpPr>
+          <p:cNvPr id="3" name="内容占位符 2"/>
+          <p:cNvSpPr>
+            <a:spLocks noGrp="1"/>
+          </p:cNvSpPr>
+          <p:nvPr>
+            <p:ph idx="1"/>
+          </p:nvPr>
+        </p:nvSpPr>
+        <p:spPr>
+          <a:xfrm>
+            <a:off x="3869268" y="864108"/>
+            <a:ext cx="7672492" cy="5120640"/>
+          </a:xfrm>
+        </p:spPr>
+        <p:txBody>
+          <a:bodyPr>
+            <a:normAutofit fontScale="92500" lnSpcReduction="10000"/>
+          </a:bodyPr>
+          <a:lstStyle/>
+          <a:p>
+            <a:pPr marL="0" indent="0">
+              <a:lnSpc>
+                <a:spcPct val="100000"/>
+              </a:lnSpc>
+              <a:buNone/>
+            </a:pPr>
+            <a:endParaRPr lang="en-US" altLang="zh-CN" dirty="0"/>
+          </a:p>
+          <a:p>
+            <a:pPr>
+              <a:lnSpc>
+                <a:spcPct val="100000"/>
+              </a:lnSpc>
+            </a:pPr>
+            <a:r>
+              <a:rPr lang="zh-CN" altLang="en-US" dirty="0"/>
+              <a:t>假设标准摩尔焓和标准摩尔熵在温度变化范围不大的情况下是</a:t>
+            </a:r>
+            <a:r>
+              <a:rPr lang="zh-CN" altLang="en-US" dirty="0" smtClean="0"/>
+              <a:t>常数</a:t>
+            </a:r>
+            <a:endParaRPr lang="en-US" altLang="zh-CN" dirty="0" smtClean="0"/>
+          </a:p>
+          <a:p>
+            <a:pPr>
+              <a:lnSpc>
+                <a:spcPct val="100000"/>
+              </a:lnSpc>
+            </a:pPr>
+            <a:r>
+              <a:rPr lang="zh-CN" altLang="en-US" dirty="0" smtClean="0"/>
+              <a:t>溶度积与热力学常数</a:t>
+            </a:r>
+            <a:r>
+              <a:rPr lang="en-US" altLang="zh-CN" dirty="0" smtClean="0"/>
+              <a:t>:</a:t>
+            </a:r>
+          </a:p>
+          <a:p>
+            <a:pPr>
+              <a:lnSpc>
+                <a:spcPct val="100000"/>
+              </a:lnSpc>
+            </a:pPr>
+            <a:endParaRPr lang="en-US" altLang="zh-CN" dirty="0"/>
+          </a:p>
+          <a:p>
+            <a:pPr>
+              <a:lnSpc>
+                <a:spcPct val="100000"/>
+              </a:lnSpc>
+            </a:pPr>
+            <a:endParaRPr lang="en-US" altLang="zh-CN" dirty="0" smtClean="0"/>
+          </a:p>
+          <a:p>
+            <a:pPr marL="0" indent="0">
+              <a:lnSpc>
+                <a:spcPct val="100000"/>
+              </a:lnSpc>
+              <a:buNone/>
+            </a:pPr>
+            <a:endParaRPr lang="en-US" altLang="zh-CN" dirty="0"/>
+          </a:p>
+          <a:p>
+            <a:pPr>
+              <a:lnSpc>
+                <a:spcPct val="100000"/>
+              </a:lnSpc>
+            </a:pPr>
+            <a:r>
+              <a:rPr lang="zh-CN" altLang="en-US" dirty="0" smtClean="0"/>
+              <a:t>通过测量不同温度下的饱和氯化银溶液电导率</a:t>
+            </a:r>
+            <a:endParaRPr lang="en-US" altLang="zh-CN" dirty="0" smtClean="0"/>
+          </a:p>
+          <a:p>
+            <a:pPr marL="0" indent="0">
+              <a:lnSpc>
+                <a:spcPct val="100000"/>
+              </a:lnSpc>
+              <a:buNone/>
+            </a:pPr>
+            <a:r>
+              <a:rPr lang="en-US" altLang="zh-CN" dirty="0" smtClean="0">
+                <a:sym typeface="Wingdings" panose="05000000000000000000" pitchFamily="2" charset="2"/>
+              </a:rPr>
+              <a:t></a:t>
+            </a:r>
+            <a:r>
+              <a:rPr lang="zh-CN" altLang="en-US" dirty="0" smtClean="0">
+                <a:sym typeface="Wingdings" panose="05000000000000000000" pitchFamily="2" charset="2"/>
+              </a:rPr>
+              <a:t>不同温度下氯化银电导率</a:t>
+            </a:r>
+            <a:endParaRPr lang="en-US" altLang="zh-CN" dirty="0" smtClean="0">
+              <a:sym typeface="Wingdings" panose="05000000000000000000" pitchFamily="2" charset="2"/>
+            </a:endParaRPr>
+          </a:p>
+          <a:p>
+            <a:pPr marL="0" indent="0">
+              <a:lnSpc>
+                <a:spcPct val="100000"/>
+              </a:lnSpc>
+              <a:buNone/>
+            </a:pPr>
+            <a:r>
+              <a:rPr lang="en-US" altLang="zh-CN" dirty="0" smtClean="0">
+                <a:sym typeface="Wingdings" panose="05000000000000000000" pitchFamily="2" charset="2"/>
+              </a:rPr>
+              <a:t></a:t>
+            </a:r>
+            <a:r>
+              <a:rPr lang="zh-CN" altLang="en-US" dirty="0" smtClean="0">
+                <a:sym typeface="Wingdings" panose="05000000000000000000" pitchFamily="2" charset="2"/>
+              </a:rPr>
+              <a:t>不同温度下饱和氯化银溶液浓度</a:t>
+            </a:r>
+            <a:endParaRPr lang="en-US" altLang="zh-CN" dirty="0" smtClean="0">
+              <a:sym typeface="Wingdings" panose="05000000000000000000" pitchFamily="2" charset="2"/>
+            </a:endParaRPr>
+          </a:p>
+          <a:p>
+            <a:pPr marL="0" indent="0">
+              <a:lnSpc>
+                <a:spcPct val="100000"/>
+              </a:lnSpc>
+              <a:buNone/>
+            </a:pPr>
+            <a:r>
+              <a:rPr lang="en-US" altLang="zh-CN" dirty="0" smtClean="0">
+                <a:sym typeface="Wingdings" panose="05000000000000000000" pitchFamily="2" charset="2"/>
+              </a:rPr>
+              <a:t></a:t>
+            </a:r>
+            <a:r>
+              <a:rPr lang="zh-CN" altLang="en-US" dirty="0" smtClean="0">
+                <a:sym typeface="Wingdings" panose="05000000000000000000" pitchFamily="2" charset="2"/>
+              </a:rPr>
+              <a:t>不同温度下氯化银溶度积</a:t>
+            </a:r>
+            <a:endParaRPr lang="en-US" altLang="zh-CN" dirty="0" smtClean="0">
+              <a:sym typeface="Wingdings" panose="05000000000000000000" pitchFamily="2" charset="2"/>
+            </a:endParaRPr>
+          </a:p>
+          <a:p>
+            <a:pPr marL="0" indent="0">
+              <a:lnSpc>
+                <a:spcPct val="100000"/>
+              </a:lnSpc>
+              <a:buNone/>
+            </a:pPr>
+            <a:r>
+              <a:rPr lang="en-US" altLang="zh-CN" dirty="0" smtClean="0">
+                <a:sym typeface="Wingdings" panose="05000000000000000000" pitchFamily="2" charset="2"/>
+              </a:rPr>
+              <a:t></a:t>
+            </a:r>
+            <a:r>
+              <a:rPr lang="zh-CN" altLang="en-US" dirty="0" smtClean="0">
+                <a:sym typeface="Wingdings" panose="05000000000000000000" pitchFamily="2" charset="2"/>
+              </a:rPr>
+              <a:t>溶度积的自然对数与温度倒数按</a:t>
+            </a:r>
+            <a:r>
+              <a:rPr lang="en-US" altLang="zh-CN" dirty="0" smtClean="0">
+                <a:sym typeface="Wingdings" panose="05000000000000000000" pitchFamily="2" charset="2"/>
+              </a:rPr>
+              <a:t>Y = AX+B</a:t>
+            </a:r>
+            <a:r>
+              <a:rPr lang="zh-CN" altLang="en-US" dirty="0" smtClean="0">
+                <a:sym typeface="Wingdings" panose="05000000000000000000" pitchFamily="2" charset="2"/>
+              </a:rPr>
+              <a:t>拟合</a:t>
+            </a:r>
+            <a:endParaRPr lang="en-US" altLang="zh-CN" dirty="0">
+              <a:sym typeface="Wingdings" panose="05000000000000000000" pitchFamily="2" charset="2"/>
+            </a:endParaRPr>
+          </a:p>
+          <a:p>
+            <a:pPr marL="0" indent="0">
+              <a:lnSpc>
+                <a:spcPct val="100000"/>
+              </a:lnSpc>
+              <a:buNone/>
+            </a:pPr>
+            <a:r>
+              <a:rPr lang="en-US" altLang="zh-CN" dirty="0" smtClean="0">
+                <a:sym typeface="Wingdings" panose="05000000000000000000" pitchFamily="2" charset="2"/>
+              </a:rPr>
+              <a:t></a:t>
+            </a:r>
+            <a:r>
+              <a:rPr lang="zh-CN" altLang="en-US" dirty="0" smtClean="0">
+                <a:sym typeface="Wingdings" panose="05000000000000000000" pitchFamily="2" charset="2"/>
+              </a:rPr>
+              <a:t>标准摩尔生成焓 </a:t>
+            </a:r>
+            <a:r>
+              <a:rPr lang="en-US" altLang="zh-CN" dirty="0" smtClean="0">
+                <a:sym typeface="Wingdings" panose="05000000000000000000" pitchFamily="2" charset="2"/>
+              </a:rPr>
+              <a:t>= -AR, </a:t>
+            </a:r>
+            <a:r>
+              <a:rPr lang="zh-CN" altLang="en-US" dirty="0" smtClean="0">
+                <a:sym typeface="Wingdings" panose="05000000000000000000" pitchFamily="2" charset="2"/>
+              </a:rPr>
+              <a:t>标准摩尔生成熵 </a:t>
+            </a:r>
+            <a:r>
+              <a:rPr lang="en-US" altLang="zh-CN" dirty="0" smtClean="0">
+                <a:sym typeface="Wingdings" panose="05000000000000000000" pitchFamily="2" charset="2"/>
+              </a:rPr>
+              <a:t>= -BR</a:t>
+            </a:r>
+            <a:endParaRPr lang="en-US" altLang="zh-CN" dirty="0" smtClean="0"/>
+          </a:p>
+        </p:txBody>
+      </p:sp>
+      <p:pic>
+        <p:nvPicPr>
+          <p:cNvPr id="5" name="图片 4"/>
+          <p:cNvPicPr>
+            <a:picLocks noChangeAspect="1"/>
+          </p:cNvPicPr>
+          <p:nvPr/>
+        </p:nvPicPr>
+        <p:blipFill>
+          <a:blip r:embed="rId7"/>
+          <a:stretch>
+            <a:fillRect/>
+          </a:stretch>
+        </p:blipFill>
+        <p:spPr>
+          <a:xfrm>
+            <a:off x="6545985" y="1799523"/>
+            <a:ext cx="2791750" cy="1462345"/>
+          </a:xfrm>
+          <a:prstGeom prst="rect">
+            <a:avLst/>
+          </a:prstGeom>
+        </p:spPr>
+      </p:pic>
+    </p:spTree>
+    <p:extLst>
+      <p:ext uri="{BB962C8B-B14F-4D97-AF65-F5344CB8AC3E}">
+        <p14:creationId xmlns:p14="http://schemas.microsoft.com/office/powerpoint/2010/main" val="3571699261"/>
+      </p:ext>
+    </p:extLst>
+  </p:cSld>
+  <p:clrMapOvr>
+    <a:masterClrMapping/>
+  </p:clrMapOvr>
+</p:sld>
+</file>
+
+<file path=ppt/slides/slide5.xml><?xml version="1.0" encoding="utf-8"?>
+<p:sld xmlns:a="http://schemas.openxmlformats.org/drawingml/2006/main" xmlns:r="http://schemas.openxmlformats.org/officeDocument/2006/relationships" xmlns:p="http://schemas.openxmlformats.org/presentationml/2006/main">
+  <p:cSld>
+    <p:spTree>
+      <p:nvGrpSpPr>
+        <p:cNvPr id="1" name=""/>
+        <p:cNvGrpSpPr/>
+        <p:nvPr/>
+      </p:nvGrpSpPr>
+      <p:grpSpPr>
+        <a:xfrm>
+          <a:off x="0" y="0"/>
+          <a:ext cx="0" cy="0"/>
+          <a:chOff x="0" y="0"/>
+          <a:chExt cx="0" cy="0"/>
+        </a:xfrm>
+      </p:grpSpPr>
+      <p:graphicFrame>
+        <p:nvGraphicFramePr>
+          <p:cNvPr id="4" name="对象 3" hidden="1"/>
+          <p:cNvGraphicFramePr>
+            <a:graphicFrameLocks noChangeAspect="1"/>
+          </p:cNvGraphicFramePr>
+          <p:nvPr>
+            <p:custDataLst>
+              <p:tags r:id="rId2"/>
+            </p:custDataLst>
+            <p:extLst>
+              <p:ext uri="{D42A27DB-BD31-4B8C-83A1-F6EECF244321}">
+                <p14:modId xmlns:p14="http://schemas.microsoft.com/office/powerpoint/2010/main" val="1027443573"/>
+              </p:ext>
+            </p:extLst>
+          </p:nvPr>
+        </p:nvGraphicFramePr>
+        <p:xfrm>
+          <a:off x="1588" y="1588"/>
+          <a:ext cx="1588" cy="1588"/>
+        </p:xfrm>
+        <a:graphic>
+          <a:graphicData uri="http://schemas.openxmlformats.org/presentationml/2006/ole">
+            <mc:AlternateContent xmlns:mc="http://schemas.openxmlformats.org/markup-compatibility/2006">
+              <mc:Choice xmlns:v="urn:schemas-microsoft-com:vml" Requires="v">
+                <p:oleObj spid="_x0000_s7180" name="think-cell Slide" r:id="rId4" imgW="395" imgH="392" progId="TCLayout.ActiveDocument.1">
                   <p:embed/>
                 </p:oleObj>
               </mc:Choice>
@@ -3730,285 +4916,202 @@
         </p:nvSpPr>
         <p:spPr/>
         <p:txBody>
-          <a:bodyPr/>
+          <a:bodyPr>
+            <a:normAutofit/>
+          </a:bodyPr>
+          <a:lstStyle/>
+          <a:p>
+            <a:r>
+              <a:rPr lang="zh-CN" altLang="en-US" sz="2800" b="1" dirty="0" smtClean="0"/>
+              <a:t>实验仪器与药品</a:t>
+            </a:r>
+            <a:endParaRPr lang="zh-CN" altLang="en-US" sz="2800" b="1" dirty="0"/>
+          </a:p>
+        </p:txBody>
+      </p:sp>
+      <p:sp>
+        <p:nvSpPr>
+          <p:cNvPr id="3" name="内容占位符 2"/>
+          <p:cNvSpPr>
+            <a:spLocks noGrp="1"/>
+          </p:cNvSpPr>
+          <p:nvPr>
+            <p:ph idx="1"/>
+          </p:nvPr>
+        </p:nvSpPr>
+        <p:spPr/>
+        <p:txBody>
+          <a:bodyPr>
+            <a:normAutofit/>
+          </a:bodyPr>
           <a:lstStyle/>
           <a:p>
             <a:r>
               <a:rPr lang="zh-CN" altLang="en-US" sz="2400" dirty="0"/>
-              <a:t>实验原理</a:t>
-            </a:r>
-            <a:r>
-              <a:rPr lang="en-US" altLang="zh-CN" sz="2400" dirty="0"/>
-              <a:t/>
-            </a:r>
-            <a:br>
-              <a:rPr lang="en-US" altLang="zh-CN" sz="2400" dirty="0"/>
-            </a:br>
-            <a:r>
-              <a:rPr lang="en-US" altLang="zh-CN" dirty="0"/>
-              <a:t/>
-            </a:r>
-            <a:br>
-              <a:rPr lang="en-US" altLang="zh-CN" dirty="0"/>
-            </a:br>
-            <a:r>
-              <a:rPr lang="zh-CN" altLang="en-US" dirty="0" smtClean="0"/>
-              <a:t>摩尔</a:t>
-            </a:r>
-            <a:r>
-              <a:rPr lang="zh-CN" altLang="en-US" b="1" dirty="0" smtClean="0"/>
-              <a:t>电导率与溶度积</a:t>
-            </a:r>
-            <a:endParaRPr lang="zh-CN" altLang="en-US" dirty="0"/>
-          </a:p>
-        </p:txBody>
-      </p:sp>
-      <p:sp>
-        <p:nvSpPr>
-          <p:cNvPr id="3" name="内容占位符 2"/>
-          <p:cNvSpPr>
-            <a:spLocks noGrp="1"/>
-          </p:cNvSpPr>
-          <p:nvPr>
-            <p:ph idx="1"/>
-          </p:nvPr>
-        </p:nvSpPr>
-        <p:spPr/>
-        <p:txBody>
-          <a:bodyPr/>
-          <a:lstStyle/>
-          <a:p>
-            <a:endParaRPr lang="en-US" altLang="zh-CN" dirty="0" smtClean="0"/>
-          </a:p>
-          <a:p>
-            <a:endParaRPr lang="en-US" altLang="zh-CN" dirty="0" smtClean="0"/>
-          </a:p>
-          <a:p>
-            <a:r>
-              <a:rPr lang="zh-CN" altLang="en-US" dirty="0" smtClean="0"/>
-              <a:t>电解质电导率</a:t>
-            </a:r>
-            <a:r>
-              <a:rPr lang="en-US" altLang="zh-CN" dirty="0" smtClean="0"/>
-              <a:t>:</a:t>
-            </a:r>
-            <a:endParaRPr lang="en-US" altLang="zh-CN" dirty="0"/>
-          </a:p>
-          <a:p>
-            <a:endParaRPr lang="en-US" altLang="zh-CN" dirty="0" smtClean="0"/>
-          </a:p>
-          <a:p>
-            <a:r>
-              <a:rPr lang="zh-CN" altLang="en-US" dirty="0" smtClean="0"/>
-              <a:t>摩尔电导率</a:t>
-            </a:r>
-            <a:r>
-              <a:rPr lang="en-US" altLang="zh-CN" dirty="0" smtClean="0"/>
-              <a:t>:</a:t>
-            </a:r>
-            <a:endParaRPr lang="en-US" altLang="zh-CN" dirty="0"/>
-          </a:p>
-          <a:p>
-            <a:pPr marL="0" indent="0">
-              <a:buNone/>
-            </a:pPr>
-            <a:endParaRPr lang="en-US" altLang="zh-CN" dirty="0"/>
-          </a:p>
-          <a:p>
-            <a:r>
-              <a:rPr lang="zh-CN" altLang="en-US" dirty="0" smtClean="0"/>
-              <a:t>难</a:t>
-            </a:r>
-            <a:r>
-              <a:rPr lang="zh-CN" altLang="en-US" dirty="0"/>
-              <a:t>溶盐摩尔电导率</a:t>
-            </a:r>
-            <a:r>
-              <a:rPr lang="en-US" altLang="zh-CN" dirty="0"/>
-              <a:t>:</a:t>
-            </a:r>
-          </a:p>
-          <a:p>
-            <a:pPr marL="0" indent="0">
-              <a:buNone/>
-            </a:pPr>
-            <a:endParaRPr lang="en-US" altLang="zh-CN" dirty="0" smtClean="0"/>
-          </a:p>
-          <a:p>
-            <a:pPr marL="0" indent="0">
-              <a:buNone/>
-            </a:pPr>
-            <a:endParaRPr lang="en-US" altLang="zh-CN" dirty="0"/>
-          </a:p>
-          <a:p>
-            <a:pPr marL="0" indent="0">
-              <a:buNone/>
-            </a:pPr>
-            <a:endParaRPr lang="en-US" altLang="zh-CN" dirty="0" smtClean="0"/>
-          </a:p>
-          <a:p>
-            <a:pPr marL="0" indent="0">
-              <a:buNone/>
-            </a:pPr>
-            <a:endParaRPr lang="en-US" altLang="zh-CN" dirty="0"/>
-          </a:p>
-          <a:p>
-            <a:r>
-              <a:rPr lang="zh-CN" altLang="en-US" dirty="0"/>
-              <a:t>难溶盐溶度积</a:t>
-            </a:r>
-            <a:r>
-              <a:rPr lang="en-US" altLang="zh-CN" dirty="0"/>
-              <a:t>:</a:t>
-            </a:r>
-          </a:p>
-          <a:p>
-            <a:pPr marL="0" indent="0">
-              <a:buNone/>
-            </a:pPr>
-            <a:endParaRPr lang="en-US" altLang="zh-CN" dirty="0" smtClean="0"/>
-          </a:p>
-          <a:p>
-            <a:pPr marL="0" indent="0">
-              <a:buNone/>
-            </a:pPr>
-            <a:endParaRPr lang="en-US" altLang="zh-CN" dirty="0" smtClean="0"/>
-          </a:p>
-          <a:p>
-            <a:pPr marL="0" indent="0">
-              <a:buNone/>
-            </a:pPr>
-            <a:endParaRPr lang="en-US" altLang="zh-CN" dirty="0"/>
-          </a:p>
-          <a:p>
-            <a:endParaRPr lang="zh-CN" altLang="en-US" dirty="0"/>
-          </a:p>
-        </p:txBody>
-      </p:sp>
-      <p:pic>
-        <p:nvPicPr>
-          <p:cNvPr id="9" name="图片 8"/>
-          <p:cNvPicPr>
-            <a:picLocks noChangeAspect="1"/>
-          </p:cNvPicPr>
-          <p:nvPr/>
-        </p:nvPicPr>
-        <p:blipFill>
-          <a:blip r:embed="rId6"/>
-          <a:stretch>
-            <a:fillRect/>
-          </a:stretch>
-        </p:blipFill>
-        <p:spPr>
-          <a:xfrm>
-            <a:off x="6758813" y="1461916"/>
-            <a:ext cx="1794059" cy="765298"/>
-          </a:xfrm>
-          <a:prstGeom prst="rect">
-            <a:avLst/>
-          </a:prstGeom>
-        </p:spPr>
-      </p:pic>
-      <p:pic>
-        <p:nvPicPr>
-          <p:cNvPr id="10" name="图片 9"/>
-          <p:cNvPicPr>
-            <a:picLocks noChangeAspect="1"/>
-          </p:cNvPicPr>
-          <p:nvPr/>
-        </p:nvPicPr>
-        <p:blipFill>
-          <a:blip r:embed="rId7"/>
-          <a:stretch>
-            <a:fillRect/>
-          </a:stretch>
-        </p:blipFill>
-        <p:spPr>
-          <a:xfrm>
-            <a:off x="6758813" y="2511694"/>
-            <a:ext cx="1869313" cy="558645"/>
-          </a:xfrm>
-          <a:prstGeom prst="rect">
-            <a:avLst/>
-          </a:prstGeom>
-        </p:spPr>
-      </p:pic>
-      <p:pic>
-        <p:nvPicPr>
-          <p:cNvPr id="12" name="图片 11"/>
-          <p:cNvPicPr>
-            <a:picLocks noChangeAspect="1"/>
-          </p:cNvPicPr>
-          <p:nvPr/>
-        </p:nvPicPr>
-        <p:blipFill>
-          <a:blip r:embed="rId8"/>
-          <a:stretch>
-            <a:fillRect/>
-          </a:stretch>
-        </p:blipFill>
-        <p:spPr>
-          <a:xfrm>
-            <a:off x="6858424" y="3070339"/>
-            <a:ext cx="2648188" cy="1570959"/>
-          </a:xfrm>
-          <a:prstGeom prst="rect">
-            <a:avLst/>
-          </a:prstGeom>
-        </p:spPr>
-      </p:pic>
-      <p:pic>
-        <p:nvPicPr>
-          <p:cNvPr id="13" name="图片 12"/>
-          <p:cNvPicPr>
-            <a:picLocks noChangeAspect="1"/>
-          </p:cNvPicPr>
-          <p:nvPr/>
-        </p:nvPicPr>
-        <p:blipFill>
-          <a:blip r:embed="rId9"/>
-          <a:stretch>
-            <a:fillRect/>
-          </a:stretch>
-        </p:blipFill>
-        <p:spPr>
-          <a:xfrm>
-            <a:off x="6858424" y="4641298"/>
-            <a:ext cx="2384717" cy="1742203"/>
-          </a:xfrm>
-          <a:prstGeom prst="rect">
-            <a:avLst/>
-          </a:prstGeom>
-        </p:spPr>
-      </p:pic>
-      <p:pic>
-        <p:nvPicPr>
-          <p:cNvPr id="14" name="图片 13"/>
-          <p:cNvPicPr>
-            <a:picLocks noChangeAspect="1"/>
-          </p:cNvPicPr>
-          <p:nvPr/>
-        </p:nvPicPr>
-        <p:blipFill>
-          <a:blip r:embed="rId10"/>
-          <a:stretch>
-            <a:fillRect/>
-          </a:stretch>
-        </p:blipFill>
-        <p:spPr>
-          <a:xfrm>
-            <a:off x="6758813" y="862562"/>
-            <a:ext cx="3009553" cy="480516"/>
-          </a:xfrm>
-          <a:prstGeom prst="rect">
-            <a:avLst/>
-          </a:prstGeom>
-        </p:spPr>
-      </p:pic>
+              <a:t>仪器</a:t>
+            </a:r>
+            <a:r>
+              <a:rPr lang="en-US" altLang="zh-CN" sz="2400" b="1" dirty="0"/>
+              <a:t>: </a:t>
+            </a:r>
+            <a:endParaRPr lang="en-US" altLang="zh-CN" sz="2400" b="1" dirty="0" smtClean="0"/>
+          </a:p>
+          <a:p>
+            <a:pPr lvl="1"/>
+            <a:r>
+              <a:rPr lang="zh-CN" altLang="en-US" sz="2000" dirty="0" smtClean="0"/>
+              <a:t>电导率仪</a:t>
+            </a:r>
+            <a:endParaRPr lang="en-US" altLang="zh-CN" sz="2000" dirty="0" smtClean="0"/>
+          </a:p>
+          <a:p>
+            <a:pPr lvl="1"/>
+            <a:r>
+              <a:rPr lang="zh-CN" altLang="en-US" sz="2000" dirty="0" smtClean="0"/>
+              <a:t>恒温槽</a:t>
+            </a:r>
+            <a:endParaRPr lang="en-US" altLang="zh-CN" sz="2000" dirty="0"/>
+          </a:p>
+          <a:p>
+            <a:pPr lvl="1"/>
+            <a:r>
+              <a:rPr lang="zh-CN" altLang="en-US" sz="2000" dirty="0" smtClean="0"/>
+              <a:t>吸</a:t>
+            </a:r>
+            <a:r>
+              <a:rPr lang="zh-CN" altLang="en-US" sz="2000" dirty="0"/>
+              <a:t>滤</a:t>
+            </a:r>
+            <a:r>
+              <a:rPr lang="zh-CN" altLang="en-US" sz="2000" dirty="0" smtClean="0"/>
+              <a:t>瓶</a:t>
+            </a:r>
+            <a:endParaRPr lang="en-US" altLang="zh-CN" sz="2000" dirty="0"/>
+          </a:p>
+          <a:p>
+            <a:pPr lvl="1"/>
+            <a:r>
+              <a:rPr lang="en-US" altLang="zh-CN" sz="2000" dirty="0" smtClean="0"/>
+              <a:t>50</a:t>
+            </a:r>
+            <a:r>
+              <a:rPr lang="en-US" altLang="zh-CN" sz="2000" i="1" dirty="0" smtClean="0"/>
+              <a:t>mL </a:t>
+            </a:r>
+            <a:r>
+              <a:rPr lang="zh-CN" altLang="en-US" sz="2000" dirty="0"/>
+              <a:t>烧杯</a:t>
+            </a:r>
+          </a:p>
+          <a:p>
+            <a:r>
+              <a:rPr lang="zh-CN" altLang="en-US" sz="2400" dirty="0" smtClean="0"/>
+              <a:t>药品</a:t>
+            </a:r>
+            <a:r>
+              <a:rPr lang="en-US" altLang="zh-CN" sz="2400" b="1" dirty="0"/>
+              <a:t>: </a:t>
+            </a:r>
+            <a:endParaRPr lang="en-US" altLang="zh-CN" sz="2400" b="1" dirty="0" smtClean="0"/>
+          </a:p>
+          <a:p>
+            <a:pPr lvl="1"/>
+            <a:r>
+              <a:rPr lang="en-US" altLang="zh-CN" sz="2000" dirty="0" smtClean="0"/>
+              <a:t>0</a:t>
+            </a:r>
+            <a:r>
+              <a:rPr lang="en-US" altLang="zh-CN" sz="2000" i="1" dirty="0"/>
+              <a:t>.</a:t>
+            </a:r>
+            <a:r>
+              <a:rPr lang="en-US" altLang="zh-CN" sz="2000" dirty="0" smtClean="0"/>
+              <a:t>1</a:t>
+            </a:r>
+            <a:r>
+              <a:rPr lang="en-US" altLang="zh-CN" sz="2000" i="1" dirty="0" smtClean="0"/>
+              <a:t>mol</a:t>
+            </a:r>
+            <a:r>
+              <a:rPr lang="en-US" altLang="zh-CN" sz="2000" dirty="0" smtClean="0"/>
+              <a:t>/</a:t>
+            </a:r>
+            <a:r>
+              <a:rPr lang="en-US" altLang="zh-CN" sz="2000" i="1" dirty="0" smtClean="0"/>
+              <a:t>L </a:t>
+            </a:r>
+            <a:r>
+              <a:rPr lang="en-US" altLang="zh-CN" sz="2000" i="1" dirty="0"/>
+              <a:t>AgNO</a:t>
+            </a:r>
+            <a:r>
+              <a:rPr lang="en-US" altLang="zh-CN" sz="2000" dirty="0"/>
+              <a:t>3 </a:t>
+            </a:r>
+            <a:r>
+              <a:rPr lang="zh-CN" altLang="en-US" sz="2000" dirty="0" smtClean="0"/>
+              <a:t>溶液</a:t>
+            </a:r>
+            <a:endParaRPr lang="en-US" altLang="zh-CN" sz="2000" dirty="0" smtClean="0"/>
+          </a:p>
+          <a:p>
+            <a:pPr lvl="1"/>
+            <a:r>
+              <a:rPr lang="en-US" altLang="zh-CN" sz="2000" dirty="0" smtClean="0"/>
+              <a:t>0</a:t>
+            </a:r>
+            <a:r>
+              <a:rPr lang="en-US" altLang="zh-CN" sz="2000" i="1" dirty="0"/>
+              <a:t>.</a:t>
+            </a:r>
+            <a:r>
+              <a:rPr lang="en-US" altLang="zh-CN" sz="2000" dirty="0" smtClean="0"/>
+              <a:t>1</a:t>
+            </a:r>
+            <a:r>
+              <a:rPr lang="en-US" altLang="zh-CN" sz="2000" i="1" dirty="0" smtClean="0"/>
+              <a:t>mol</a:t>
+            </a:r>
+            <a:r>
+              <a:rPr lang="en-US" altLang="zh-CN" sz="2000" dirty="0" smtClean="0"/>
+              <a:t>/</a:t>
+            </a:r>
+            <a:r>
+              <a:rPr lang="en-US" altLang="zh-CN" sz="2000" i="1" dirty="0" smtClean="0"/>
+              <a:t>L </a:t>
+            </a:r>
+            <a:r>
+              <a:rPr lang="en-US" altLang="zh-CN" sz="2000" i="1" dirty="0" err="1"/>
+              <a:t>KCl</a:t>
+            </a:r>
+            <a:r>
+              <a:rPr lang="en-US" altLang="zh-CN" sz="2000" i="1" dirty="0"/>
+              <a:t> </a:t>
+            </a:r>
+            <a:r>
+              <a:rPr lang="zh-CN" altLang="en-US" sz="2000" dirty="0" smtClean="0"/>
+              <a:t>溶液</a:t>
+            </a:r>
+            <a:endParaRPr lang="en-US" altLang="zh-CN" sz="2000" dirty="0"/>
+          </a:p>
+          <a:p>
+            <a:pPr lvl="1"/>
+            <a:r>
+              <a:rPr lang="zh-CN" altLang="en-US" sz="2000" dirty="0" smtClean="0"/>
+              <a:t>电导</a:t>
+            </a:r>
+            <a:r>
+              <a:rPr lang="zh-CN" altLang="en-US" sz="2000" dirty="0"/>
+              <a:t>水</a:t>
+            </a:r>
+            <a:endParaRPr lang="zh-CN" altLang="en-US" sz="2000" dirty="0"/>
+          </a:p>
+        </p:txBody>
+      </p:sp>
     </p:spTree>
     <p:extLst>
       <p:ext uri="{BB962C8B-B14F-4D97-AF65-F5344CB8AC3E}">
-        <p14:creationId xmlns:p14="http://schemas.microsoft.com/office/powerpoint/2010/main" val="3677243077"/>
+        <p14:creationId xmlns:p14="http://schemas.microsoft.com/office/powerpoint/2010/main" val="2207747567"/>
       </p:ext>
     </p:extLst>
   </p:cSld>
@@ -4018,7 +5121,7 @@
 </p:sld>
 </file>
 
-<file path=ppt/slides/slide3.xml><?xml version="1.0" encoding="utf-8"?>
+<file path=ppt/slides/slide6.xml><?xml version="1.0" encoding="utf-8"?>
 <p:sld xmlns:a="http://schemas.openxmlformats.org/drawingml/2006/main" xmlns:r="http://schemas.openxmlformats.org/officeDocument/2006/relationships" xmlns:p="http://schemas.openxmlformats.org/presentationml/2006/main">
   <p:cSld>
     <p:spTree>
@@ -4047,7 +5150,7 @@
             </p:custDataLst>
             <p:extLst>
               <p:ext uri="{D42A27DB-BD31-4B8C-83A1-F6EECF244321}">
-                <p14:modId xmlns:p14="http://schemas.microsoft.com/office/powerpoint/2010/main" val="3782212757"/>
+                <p14:modId xmlns:p14="http://schemas.microsoft.com/office/powerpoint/2010/main" val="193355579"/>
               </p:ext>
             </p:extLst>
           </p:nvPr>
@@ -4060,7 +5163,7 @@
           <a:graphicData uri="http://schemas.openxmlformats.org/presentationml/2006/ole">
             <mc:AlternateContent xmlns:mc="http://schemas.openxmlformats.org/markup-compatibility/2006">
               <mc:Choice xmlns:v="urn:schemas-microsoft-com:vml" Requires="v">
-                <p:oleObj spid="_x0000_s2072" name="think-cell Slide" r:id="rId4" imgW="395" imgH="392" progId="TCLayout.ActiveDocument.1">
+                <p:oleObj spid="_x0000_s3104" name="think-cell Slide" r:id="rId4" imgW="395" imgH="392" progId="TCLayout.ActiveDocument.1">
                   <p:embed/>
                 </p:oleObj>
               </mc:Choice>
@@ -4107,7 +5210,9 @@
         </p:nvSpPr>
         <p:spPr/>
         <p:txBody>
-          <a:bodyPr/>
+          <a:bodyPr>
+            <a:normAutofit/>
+          </a:bodyPr>
           <a:lstStyle/>
           <a:p>
             <a:r>
@@ -4116,7 +5221,7 @@
             </a:r>
             <a:r>
               <a:rPr lang="zh-CN" altLang="en-US" sz="2400" dirty="0" smtClean="0"/>
-              <a:t>原理</a:t>
+              <a:t>方案</a:t>
             </a:r>
             <a:r>
               <a:rPr lang="en-US" altLang="zh-CN" sz="2400" dirty="0" smtClean="0"/>
@@ -4126,16 +5231,17 @@
               <a:rPr lang="en-US" altLang="zh-CN" sz="2400" dirty="0" smtClean="0"/>
             </a:br>
             <a:r>
-              <a:rPr lang="en-US" altLang="zh-CN" dirty="0"/>
+              <a:rPr lang="en-US" altLang="zh-CN" sz="2400" dirty="0"/>
               <a:t/>
             </a:r>
             <a:br>
-              <a:rPr lang="en-US" altLang="zh-CN" dirty="0"/>
+              <a:rPr lang="en-US" altLang="zh-CN" sz="2400" dirty="0"/>
             </a:br>
             <a:r>
-              <a:rPr lang="zh-CN" altLang="en-US" b="1" dirty="0"/>
-              <a:t>热力学平衡</a:t>
-            </a:r>
+              <a:rPr lang="zh-CN" altLang="en-US" sz="2800" b="1" dirty="0" smtClean="0"/>
+              <a:t>氯化银制备</a:t>
+            </a:r>
+            <a:endParaRPr lang="zh-CN" altLang="en-US" sz="2800" b="1" dirty="0"/>
           </a:p>
         </p:txBody>
       </p:sp>
@@ -4149,267 +5255,177 @@
             <p:ph idx="1"/>
           </p:nvPr>
         </p:nvSpPr>
-        <p:spPr>
-          <a:xfrm>
-            <a:off x="3869268" y="864108"/>
-            <a:ext cx="7672492" cy="5120640"/>
-          </a:xfrm>
-        </p:spPr>
+        <p:spPr/>
         <p:txBody>
           <a:bodyPr>
-            <a:normAutofit fontScale="92500" lnSpcReduction="10000"/>
+            <a:normAutofit/>
           </a:bodyPr>
           <a:lstStyle/>
           <a:p>
-            <a:pPr marL="0" indent="0">
-              <a:lnSpc>
-                <a:spcPct val="100000"/>
-              </a:lnSpc>
-              <a:buNone/>
-            </a:pPr>
-            <a:endParaRPr lang="en-US" altLang="zh-CN" dirty="0"/>
-          </a:p>
-          <a:p>
-            <a:pPr>
-              <a:lnSpc>
-                <a:spcPct val="100000"/>
-              </a:lnSpc>
-            </a:pPr>
-            <a:r>
-              <a:rPr lang="zh-CN" altLang="en-US" dirty="0"/>
-              <a:t>假设标准摩尔焓和标准摩尔熵在温度变化范围不大的情况下是</a:t>
-            </a:r>
-            <a:r>
-              <a:rPr lang="zh-CN" altLang="en-US" dirty="0" smtClean="0"/>
-              <a:t>常数</a:t>
-            </a:r>
-            <a:endParaRPr lang="en-US" altLang="zh-CN" dirty="0" smtClean="0"/>
-          </a:p>
-          <a:p>
-            <a:pPr>
-              <a:lnSpc>
-                <a:spcPct val="100000"/>
-              </a:lnSpc>
-            </a:pPr>
-            <a:r>
-              <a:rPr lang="zh-CN" altLang="en-US" dirty="0" smtClean="0"/>
-              <a:t>溶度积与热力学常数</a:t>
-            </a:r>
-            <a:r>
-              <a:rPr lang="en-US" altLang="zh-CN" dirty="0" smtClean="0"/>
-              <a:t>:</a:t>
-            </a:r>
-          </a:p>
-          <a:p>
-            <a:pPr>
-              <a:lnSpc>
-                <a:spcPct val="100000"/>
-              </a:lnSpc>
-            </a:pPr>
-            <a:endParaRPr lang="en-US" altLang="zh-CN" dirty="0"/>
-          </a:p>
-          <a:p>
-            <a:pPr>
-              <a:lnSpc>
-                <a:spcPct val="100000"/>
-              </a:lnSpc>
-            </a:pPr>
-            <a:endParaRPr lang="en-US" altLang="zh-CN" dirty="0" smtClean="0"/>
-          </a:p>
-          <a:p>
-            <a:pPr marL="0" indent="0">
-              <a:lnSpc>
-                <a:spcPct val="100000"/>
-              </a:lnSpc>
-              <a:buNone/>
-            </a:pPr>
-            <a:endParaRPr lang="en-US" altLang="zh-CN" dirty="0"/>
-          </a:p>
-          <a:p>
-            <a:pPr>
-              <a:lnSpc>
-                <a:spcPct val="100000"/>
-              </a:lnSpc>
-            </a:pPr>
-            <a:r>
-              <a:rPr lang="zh-CN" altLang="en-US" dirty="0" smtClean="0"/>
-              <a:t>通过测量不同温度下的饱和氯化银溶液电导率</a:t>
-            </a:r>
-            <a:endParaRPr lang="en-US" altLang="zh-CN" dirty="0" smtClean="0"/>
-          </a:p>
-          <a:p>
-            <a:pPr marL="0" indent="0">
-              <a:lnSpc>
-                <a:spcPct val="100000"/>
-              </a:lnSpc>
-              <a:buNone/>
-            </a:pPr>
-            <a:r>
-              <a:rPr lang="en-US" altLang="zh-CN" dirty="0" smtClean="0">
-                <a:sym typeface="Wingdings" panose="05000000000000000000" pitchFamily="2" charset="2"/>
-              </a:rPr>
-              <a:t></a:t>
-            </a:r>
-            <a:r>
-              <a:rPr lang="zh-CN" altLang="en-US" dirty="0" smtClean="0">
-                <a:sym typeface="Wingdings" panose="05000000000000000000" pitchFamily="2" charset="2"/>
-              </a:rPr>
-              <a:t>不同温度下氯化银电导率</a:t>
-            </a:r>
-            <a:endParaRPr lang="en-US" altLang="zh-CN" dirty="0" smtClean="0">
-              <a:sym typeface="Wingdings" panose="05000000000000000000" pitchFamily="2" charset="2"/>
-            </a:endParaRPr>
-          </a:p>
-          <a:p>
-            <a:pPr marL="0" indent="0">
-              <a:lnSpc>
-                <a:spcPct val="100000"/>
-              </a:lnSpc>
-              <a:buNone/>
-            </a:pPr>
-            <a:r>
-              <a:rPr lang="en-US" altLang="zh-CN" dirty="0" smtClean="0">
-                <a:sym typeface="Wingdings" panose="05000000000000000000" pitchFamily="2" charset="2"/>
-              </a:rPr>
-              <a:t></a:t>
-            </a:r>
-            <a:r>
-              <a:rPr lang="zh-CN" altLang="en-US" dirty="0" smtClean="0">
-                <a:sym typeface="Wingdings" panose="05000000000000000000" pitchFamily="2" charset="2"/>
-              </a:rPr>
-              <a:t>不同温度下饱和氯化银溶液浓度</a:t>
-            </a:r>
-            <a:endParaRPr lang="en-US" altLang="zh-CN" dirty="0" smtClean="0">
-              <a:sym typeface="Wingdings" panose="05000000000000000000" pitchFamily="2" charset="2"/>
-            </a:endParaRPr>
-          </a:p>
-          <a:p>
-            <a:pPr marL="0" indent="0">
-              <a:lnSpc>
-                <a:spcPct val="100000"/>
-              </a:lnSpc>
-              <a:buNone/>
-            </a:pPr>
-            <a:r>
-              <a:rPr lang="en-US" altLang="zh-CN" dirty="0" smtClean="0">
-                <a:sym typeface="Wingdings" panose="05000000000000000000" pitchFamily="2" charset="2"/>
-              </a:rPr>
-              <a:t></a:t>
-            </a:r>
-            <a:r>
-              <a:rPr lang="zh-CN" altLang="en-US" dirty="0" smtClean="0">
-                <a:sym typeface="Wingdings" panose="05000000000000000000" pitchFamily="2" charset="2"/>
-              </a:rPr>
-              <a:t>不同温度下氯化银溶度积</a:t>
-            </a:r>
-            <a:endParaRPr lang="en-US" altLang="zh-CN" dirty="0" smtClean="0">
-              <a:sym typeface="Wingdings" panose="05000000000000000000" pitchFamily="2" charset="2"/>
-            </a:endParaRPr>
-          </a:p>
-          <a:p>
-            <a:pPr marL="0" indent="0">
-              <a:lnSpc>
-                <a:spcPct val="100000"/>
-              </a:lnSpc>
-              <a:buNone/>
-            </a:pPr>
-            <a:r>
-              <a:rPr lang="en-US" altLang="zh-CN" dirty="0" smtClean="0">
-                <a:sym typeface="Wingdings" panose="05000000000000000000" pitchFamily="2" charset="2"/>
-              </a:rPr>
-              <a:t></a:t>
-            </a:r>
-            <a:r>
-              <a:rPr lang="zh-CN" altLang="en-US" dirty="0" smtClean="0">
-                <a:sym typeface="Wingdings" panose="05000000000000000000" pitchFamily="2" charset="2"/>
-              </a:rPr>
-              <a:t>溶度积的自然对数与温度倒数按</a:t>
-            </a:r>
-            <a:r>
-              <a:rPr lang="en-US" altLang="zh-CN" dirty="0" smtClean="0">
-                <a:sym typeface="Wingdings" panose="05000000000000000000" pitchFamily="2" charset="2"/>
-              </a:rPr>
-              <a:t>Y = AX+B</a:t>
-            </a:r>
-            <a:r>
-              <a:rPr lang="zh-CN" altLang="en-US" dirty="0" smtClean="0">
-                <a:sym typeface="Wingdings" panose="05000000000000000000" pitchFamily="2" charset="2"/>
-              </a:rPr>
-              <a:t>拟合</a:t>
-            </a:r>
-            <a:endParaRPr lang="en-US" altLang="zh-CN" dirty="0">
-              <a:sym typeface="Wingdings" panose="05000000000000000000" pitchFamily="2" charset="2"/>
-            </a:endParaRPr>
-          </a:p>
-          <a:p>
-            <a:pPr marL="0" indent="0">
-              <a:lnSpc>
-                <a:spcPct val="100000"/>
-              </a:lnSpc>
-              <a:buNone/>
-            </a:pPr>
-            <a:r>
-              <a:rPr lang="en-US" altLang="zh-CN" dirty="0" smtClean="0">
-                <a:sym typeface="Wingdings" panose="05000000000000000000" pitchFamily="2" charset="2"/>
-              </a:rPr>
-              <a:t></a:t>
-            </a:r>
-            <a:r>
-              <a:rPr lang="zh-CN" altLang="en-US" dirty="0" smtClean="0">
-                <a:sym typeface="Wingdings" panose="05000000000000000000" pitchFamily="2" charset="2"/>
-              </a:rPr>
-              <a:t>标准摩尔生成焓 </a:t>
-            </a:r>
-            <a:r>
-              <a:rPr lang="en-US" altLang="zh-CN" dirty="0" smtClean="0">
-                <a:sym typeface="Wingdings" panose="05000000000000000000" pitchFamily="2" charset="2"/>
-              </a:rPr>
-              <a:t>= -AR, </a:t>
-            </a:r>
-            <a:r>
-              <a:rPr lang="zh-CN" altLang="en-US" dirty="0" smtClean="0">
-                <a:sym typeface="Wingdings" panose="05000000000000000000" pitchFamily="2" charset="2"/>
-              </a:rPr>
-              <a:t>标准摩尔生成熵 </a:t>
-            </a:r>
-            <a:r>
-              <a:rPr lang="en-US" altLang="zh-CN" dirty="0" smtClean="0">
-                <a:sym typeface="Wingdings" panose="05000000000000000000" pitchFamily="2" charset="2"/>
-              </a:rPr>
-              <a:t>= -BR</a:t>
-            </a:r>
-            <a:endParaRPr lang="en-US" altLang="zh-CN" dirty="0" smtClean="0"/>
-          </a:p>
-        </p:txBody>
-      </p:sp>
-      <p:pic>
-        <p:nvPicPr>
-          <p:cNvPr id="5" name="图片 4"/>
-          <p:cNvPicPr>
-            <a:picLocks noChangeAspect="1"/>
-          </p:cNvPicPr>
-          <p:nvPr/>
-        </p:nvPicPr>
-        <p:blipFill>
-          <a:blip r:embed="rId6"/>
-          <a:stretch>
-            <a:fillRect/>
-          </a:stretch>
-        </p:blipFill>
-        <p:spPr>
-          <a:xfrm>
-            <a:off x="6545985" y="1799523"/>
-            <a:ext cx="2791750" cy="1462345"/>
-          </a:xfrm>
-          <a:prstGeom prst="rect">
-            <a:avLst/>
-          </a:prstGeom>
-        </p:spPr>
-      </p:pic>
+            <a:r>
+              <a:rPr lang="zh-CN" altLang="en-US" sz="2400" dirty="0"/>
+              <a:t>取</a:t>
+            </a:r>
+            <a:r>
+              <a:rPr lang="en-US" altLang="zh-CN" sz="2400" dirty="0"/>
+              <a:t>10</a:t>
+            </a:r>
+            <a:r>
+              <a:rPr lang="en-US" altLang="zh-CN" sz="2400" i="1" dirty="0"/>
+              <a:t>mL </a:t>
+            </a:r>
+            <a:r>
+              <a:rPr lang="en-US" altLang="zh-CN" sz="2400" dirty="0" smtClean="0"/>
+              <a:t>0</a:t>
+            </a:r>
+            <a:r>
+              <a:rPr lang="en-US" altLang="zh-CN" sz="2400" i="1" dirty="0" smtClean="0"/>
+              <a:t>.</a:t>
+            </a:r>
+            <a:r>
+              <a:rPr lang="en-US" altLang="zh-CN" sz="2400" dirty="0" smtClean="0"/>
+              <a:t>1</a:t>
+            </a:r>
+            <a:r>
+              <a:rPr lang="en-US" altLang="zh-CN" sz="2400" i="1" dirty="0" smtClean="0"/>
+              <a:t>mol/L </a:t>
+            </a:r>
+            <a:r>
+              <a:rPr lang="en-US" altLang="zh-CN" sz="2400" i="1" dirty="0"/>
+              <a:t>AgNO</a:t>
+            </a:r>
+            <a:r>
+              <a:rPr lang="en-US" altLang="zh-CN" sz="2400" dirty="0"/>
+              <a:t>3 </a:t>
+            </a:r>
+            <a:r>
+              <a:rPr lang="zh-CN" altLang="en-US" sz="2400" dirty="0"/>
+              <a:t>溶液于烧杯中</a:t>
+            </a:r>
+            <a:r>
+              <a:rPr lang="en-US" altLang="zh-CN" sz="2400" dirty="0"/>
+              <a:t>, </a:t>
+            </a:r>
+            <a:r>
+              <a:rPr lang="zh-CN" altLang="en-US" sz="2400" dirty="0"/>
+              <a:t>向其中加入</a:t>
+            </a:r>
+            <a:r>
+              <a:rPr lang="en-US" altLang="zh-CN" sz="2400" dirty="0"/>
+              <a:t>10</a:t>
+            </a:r>
+            <a:r>
+              <a:rPr lang="en-US" altLang="zh-CN" sz="2400" i="1" dirty="0"/>
+              <a:t>mL </a:t>
+            </a:r>
+            <a:r>
+              <a:rPr lang="en-US" altLang="zh-CN" sz="2400" dirty="0"/>
+              <a:t>0</a:t>
+            </a:r>
+            <a:r>
+              <a:rPr lang="en-US" altLang="zh-CN" sz="2400" i="1" dirty="0"/>
+              <a:t>.</a:t>
+            </a:r>
+            <a:r>
+              <a:rPr lang="en-US" altLang="zh-CN" sz="2400" dirty="0"/>
+              <a:t>1</a:t>
+            </a:r>
+            <a:r>
+              <a:rPr lang="en-US" altLang="zh-CN" sz="2400" i="1" dirty="0"/>
+              <a:t>mol/L</a:t>
+            </a:r>
+            <a:r>
+              <a:rPr lang="en-US" altLang="zh-CN" sz="2400" i="1" dirty="0" smtClean="0"/>
+              <a:t> </a:t>
+            </a:r>
+            <a:r>
+              <a:rPr lang="en-US" altLang="zh-CN" sz="2400" i="1" dirty="0" err="1"/>
+              <a:t>KCl</a:t>
+            </a:r>
+            <a:r>
+              <a:rPr lang="en-US" altLang="zh-CN" sz="2400" i="1" dirty="0"/>
+              <a:t> </a:t>
+            </a:r>
+            <a:r>
+              <a:rPr lang="zh-CN" altLang="en-US" sz="2400" dirty="0" smtClean="0"/>
+              <a:t>溶液 </a:t>
+            </a:r>
+            <a:r>
+              <a:rPr lang="en-US" altLang="zh-CN" sz="2400" dirty="0" smtClean="0"/>
+              <a:t>(</a:t>
+            </a:r>
+            <a:r>
+              <a:rPr lang="zh-CN" altLang="en-US" sz="2400" dirty="0"/>
+              <a:t>边加边</a:t>
+            </a:r>
+            <a:r>
+              <a:rPr lang="zh-CN" altLang="en-US" sz="2400" dirty="0" smtClean="0"/>
+              <a:t>搅拌</a:t>
+            </a:r>
+            <a:r>
+              <a:rPr lang="en-US" altLang="zh-CN" sz="2400" dirty="0"/>
+              <a:t>).</a:t>
+            </a:r>
+          </a:p>
+          <a:p>
+            <a:r>
+              <a:rPr lang="zh-CN" altLang="en-US" sz="2400" dirty="0" smtClean="0"/>
+              <a:t>用</a:t>
+            </a:r>
+            <a:r>
+              <a:rPr lang="zh-CN" altLang="en-US" sz="2400" dirty="0"/>
+              <a:t>吸滤瓶过滤溶液</a:t>
+            </a:r>
+            <a:r>
+              <a:rPr lang="en-US" altLang="zh-CN" sz="2400" dirty="0"/>
+              <a:t>, </a:t>
+            </a:r>
+            <a:r>
+              <a:rPr lang="zh-CN" altLang="en-US" sz="2400" dirty="0"/>
+              <a:t>滴加电导水抽滤</a:t>
+            </a:r>
+            <a:r>
+              <a:rPr lang="en-US" altLang="zh-CN" sz="2400" dirty="0"/>
+              <a:t>3 </a:t>
+            </a:r>
+            <a:r>
+              <a:rPr lang="zh-CN" altLang="en-US" sz="2400" dirty="0"/>
+              <a:t>次</a:t>
+            </a:r>
+            <a:r>
+              <a:rPr lang="en-US" altLang="zh-CN" sz="2400" dirty="0"/>
+              <a:t>.</a:t>
+            </a:r>
+          </a:p>
+          <a:p>
+            <a:r>
+              <a:rPr lang="zh-CN" altLang="en-US" sz="2400" dirty="0" smtClean="0"/>
+              <a:t>称量</a:t>
+            </a:r>
+            <a:r>
+              <a:rPr lang="zh-CN" altLang="en-US" sz="2400" dirty="0"/>
+              <a:t>制得的白色固体</a:t>
+            </a:r>
+            <a:r>
+              <a:rPr lang="en-US" altLang="zh-CN" sz="2400" dirty="0"/>
+              <a:t>, </a:t>
+            </a:r>
+            <a:r>
+              <a:rPr lang="zh-CN" altLang="en-US" sz="2400" dirty="0"/>
+              <a:t>并将其保存在棕色试剂瓶中或立即使用</a:t>
+            </a:r>
+            <a:r>
+              <a:rPr lang="en-US" altLang="zh-CN" sz="2400" dirty="0"/>
+              <a:t>.</a:t>
+            </a:r>
+            <a:endParaRPr lang="zh-CN" altLang="en-US" sz="2400" dirty="0"/>
+          </a:p>
+        </p:txBody>
+      </p:sp>
     </p:spTree>
     <p:extLst>
       <p:ext uri="{BB962C8B-B14F-4D97-AF65-F5344CB8AC3E}">
-        <p14:creationId xmlns:p14="http://schemas.microsoft.com/office/powerpoint/2010/main" val="3571699261"/>
+        <p14:creationId xmlns:p14="http://schemas.microsoft.com/office/powerpoint/2010/main" val="1749368024"/>
       </p:ext>
     </p:extLst>
   </p:cSld>
@@ -4419,7 +5435,7 @@
 </p:sld>
 </file>
 
-<file path=ppt/slides/slide4.xml><?xml version="1.0" encoding="utf-8"?>
+<file path=ppt/slides/slide7.xml><?xml version="1.0" encoding="utf-8"?>
 <p:sld xmlns:a="http://schemas.openxmlformats.org/drawingml/2006/main" xmlns:r="http://schemas.openxmlformats.org/officeDocument/2006/relationships" xmlns:p="http://schemas.openxmlformats.org/presentationml/2006/main">
   <p:cSld>
     <p:spTree>
@@ -4448,7 +5464,7 @@
             </p:custDataLst>
             <p:extLst>
               <p:ext uri="{D42A27DB-BD31-4B8C-83A1-F6EECF244321}">
-                <p14:modId xmlns:p14="http://schemas.microsoft.com/office/powerpoint/2010/main" val="71700645"/>
+                <p14:modId xmlns:p14="http://schemas.microsoft.com/office/powerpoint/2010/main" val="1541032528"/>
               </p:ext>
             </p:extLst>
           </p:nvPr>
@@ -4461,7 +5477,7 @@
           <a:graphicData uri="http://schemas.openxmlformats.org/presentationml/2006/ole">
             <mc:AlternateContent xmlns:mc="http://schemas.openxmlformats.org/markup-compatibility/2006">
               <mc:Choice xmlns:v="urn:schemas-microsoft-com:vml" Requires="v">
-                <p:oleObj spid="_x0000_s3093" name="think-cell Slide" r:id="rId4" imgW="395" imgH="392" progId="TCLayout.ActiveDocument.1">
+                <p:oleObj spid="_x0000_s4127" name="think-cell Slide" r:id="rId4" imgW="395" imgH="392" progId="TCLayout.ActiveDocument.1">
                   <p:embed/>
                 </p:oleObj>
               </mc:Choice>
@@ -4508,6 +5524,47 @@
         </p:nvSpPr>
         <p:spPr/>
         <p:txBody>
+          <a:bodyPr/>
+          <a:lstStyle/>
+          <a:p>
+            <a:r>
+              <a:rPr lang="zh-CN" altLang="en-US" sz="2400" dirty="0"/>
+              <a:t>实验方案</a:t>
+            </a:r>
+            <a:r>
+              <a:rPr lang="en-US" altLang="zh-CN" sz="2400" dirty="0"/>
+              <a:t/>
+            </a:r>
+            <a:br>
+              <a:rPr lang="en-US" altLang="zh-CN" sz="2400" dirty="0"/>
+            </a:br>
+            <a:r>
+              <a:rPr lang="en-US" altLang="zh-CN" sz="2400" dirty="0"/>
+              <a:t/>
+            </a:r>
+            <a:br>
+              <a:rPr lang="en-US" altLang="zh-CN" sz="2400" dirty="0"/>
+            </a:br>
+            <a:r>
+              <a:rPr lang="zh-CN" altLang="en-US" sz="2800" b="1" dirty="0" smtClean="0"/>
+              <a:t>电导率测定</a:t>
+            </a:r>
+            <a:endParaRPr lang="zh-CN" altLang="en-US" sz="2800" dirty="0"/>
+          </a:p>
+        </p:txBody>
+      </p:sp>
+      <p:sp>
+        <p:nvSpPr>
+          <p:cNvPr id="3" name="内容占位符 2"/>
+          <p:cNvSpPr>
+            <a:spLocks noGrp="1"/>
+          </p:cNvSpPr>
+          <p:nvPr>
+            <p:ph idx="1"/>
+          </p:nvPr>
+        </p:nvSpPr>
+        <p:spPr/>
+        <p:txBody>
           <a:bodyPr>
             <a:normAutofit/>
           </a:bodyPr>
@@ -4515,90 +5572,31 @@
           <a:p>
             <a:r>
               <a:rPr lang="zh-CN" altLang="en-US" sz="2400" dirty="0"/>
-              <a:t>实验</a:t>
-            </a:r>
-            <a:r>
-              <a:rPr lang="zh-CN" altLang="en-US" sz="2400" dirty="0" smtClean="0"/>
-              <a:t>方案</a:t>
-            </a:r>
-            <a:r>
-              <a:rPr lang="en-US" altLang="zh-CN" sz="2400" dirty="0" smtClean="0"/>
-              <a:t/>
-            </a:r>
-            <a:br>
-              <a:rPr lang="en-US" altLang="zh-CN" sz="2400" dirty="0" smtClean="0"/>
-            </a:br>
+              <a:t>取少量新制的</a:t>
+            </a:r>
+            <a:r>
+              <a:rPr lang="en-US" altLang="zh-CN" sz="2400" i="1" dirty="0" err="1"/>
+              <a:t>AgCl</a:t>
+            </a:r>
+            <a:r>
+              <a:rPr lang="en-US" altLang="zh-CN" sz="2400" i="1" dirty="0"/>
+              <a:t> </a:t>
+            </a:r>
+            <a:r>
+              <a:rPr lang="zh-CN" altLang="en-US" sz="2400" dirty="0"/>
+              <a:t>固体溶解在</a:t>
+            </a:r>
             <a:r>
               <a:rPr lang="en-US" altLang="zh-CN" sz="2400" dirty="0"/>
-              <a:t/>
-            </a:r>
-            <a:br>
-              <a:rPr lang="en-US" altLang="zh-CN" sz="2400" dirty="0"/>
-            </a:br>
-            <a:r>
-              <a:rPr lang="zh-CN" altLang="en-US" b="1" dirty="0" smtClean="0"/>
-              <a:t>氯化银制备</a:t>
-            </a:r>
-            <a:endParaRPr lang="zh-CN" altLang="en-US" b="1" dirty="0"/>
-          </a:p>
-        </p:txBody>
-      </p:sp>
-      <p:sp>
-        <p:nvSpPr>
-          <p:cNvPr id="3" name="内容占位符 2"/>
-          <p:cNvSpPr>
-            <a:spLocks noGrp="1"/>
-          </p:cNvSpPr>
-          <p:nvPr>
-            <p:ph idx="1"/>
-          </p:nvPr>
-        </p:nvSpPr>
-        <p:spPr/>
-        <p:txBody>
-          <a:bodyPr>
-            <a:normAutofit/>
-          </a:bodyPr>
-          <a:lstStyle/>
-          <a:p>
-            <a:r>
-              <a:rPr lang="zh-CN" altLang="en-US" sz="2400" dirty="0"/>
-              <a:t>取</a:t>
-            </a:r>
-            <a:r>
-              <a:rPr lang="en-US" altLang="zh-CN" sz="2400" dirty="0"/>
-              <a:t>10</a:t>
+              <a:t>50</a:t>
             </a:r>
             <a:r>
               <a:rPr lang="en-US" altLang="zh-CN" sz="2400" i="1" dirty="0"/>
               <a:t>mL </a:t>
             </a:r>
             <a:r>
-              <a:rPr lang="en-US" altLang="zh-CN" sz="2400" dirty="0" smtClean="0"/>
-              <a:t>0</a:t>
-            </a:r>
-            <a:r>
-              <a:rPr lang="en-US" altLang="zh-CN" sz="2400" i="1" dirty="0" smtClean="0"/>
-              <a:t>.</a:t>
-            </a:r>
-            <a:r>
-              <a:rPr lang="en-US" altLang="zh-CN" sz="2400" dirty="0" smtClean="0"/>
-              <a:t>1</a:t>
-            </a:r>
-            <a:r>
-              <a:rPr lang="en-US" altLang="zh-CN" sz="2400" i="1" dirty="0" smtClean="0"/>
-              <a:t>mol/L </a:t>
-            </a:r>
-            <a:r>
-              <a:rPr lang="en-US" altLang="zh-CN" sz="2400" i="1" dirty="0"/>
-              <a:t>AgNO</a:t>
-            </a:r>
-            <a:r>
-              <a:rPr lang="en-US" altLang="zh-CN" sz="2400" dirty="0"/>
-              <a:t>3 </a:t>
-            </a:r>
-            <a:r>
               <a:rPr lang="zh-CN" altLang="en-US" sz="2400" dirty="0"/>
-              <a:t>溶液于烧杯中</a:t>
+              <a:t>烧杯中</a:t>
             </a:r>
             <a:r>
               <a:rPr lang="en-US" altLang="zh-CN" sz="2400" dirty="0"/>
@@ -4606,73 +5604,115 @@
             </a:r>
             <a:r>
               <a:rPr lang="zh-CN" altLang="en-US" sz="2400" dirty="0"/>
-              <a:t>向其中加入</a:t>
-            </a:r>
-            <a:r>
-              <a:rPr lang="en-US" altLang="zh-CN" sz="2400"/>
-              <a:t>10</a:t>
-            </a:r>
-            <a:r>
-              <a:rPr lang="en-US" altLang="zh-CN" sz="2400" i="1"/>
+              <a:t>加入</a:t>
+            </a:r>
+            <a:r>
+              <a:rPr lang="en-US" altLang="zh-CN" sz="2400" dirty="0"/>
+              <a:t>20</a:t>
+            </a:r>
+            <a:r>
+              <a:rPr lang="en-US" altLang="zh-CN" sz="2400" i="1" dirty="0"/>
               <a:t>mL </a:t>
             </a:r>
             <a:r>
-              <a:rPr lang="en-US" altLang="zh-CN" sz="2400"/>
-              <a:t>0</a:t>
-            </a:r>
-            <a:r>
-              <a:rPr lang="en-US" altLang="zh-CN" sz="2400" i="1"/>
+              <a:rPr lang="zh-CN" altLang="en-US" sz="2400" dirty="0"/>
+              <a:t>电导水</a:t>
+            </a:r>
+            <a:r>
+              <a:rPr lang="en-US" altLang="zh-CN" sz="2400" dirty="0"/>
+              <a:t>, </a:t>
+            </a:r>
+            <a:r>
+              <a:rPr lang="zh-CN" altLang="en-US" sz="2400" dirty="0"/>
+              <a:t>搅拌</a:t>
+            </a:r>
+            <a:r>
+              <a:rPr lang="en-US" altLang="zh-CN" sz="2400" dirty="0"/>
+              <a:t>, </a:t>
+            </a:r>
+            <a:r>
+              <a:rPr lang="zh-CN" altLang="en-US" sz="2400" dirty="0"/>
+              <a:t>在</a:t>
+            </a:r>
+            <a:r>
+              <a:rPr lang="en-US" altLang="zh-CN" sz="2400" dirty="0"/>
+              <a:t>25</a:t>
+            </a:r>
+            <a:r>
+              <a:rPr lang="zh-CN" altLang="en-US" sz="2400" i="1" dirty="0"/>
+              <a:t>◦</a:t>
+            </a:r>
+            <a:r>
+              <a:rPr lang="en-US" altLang="zh-CN" sz="2400" dirty="0"/>
+              <a:t>C </a:t>
+            </a:r>
+            <a:r>
+              <a:rPr lang="zh-CN" altLang="en-US" sz="2400" dirty="0"/>
+              <a:t>恒温槽中</a:t>
+            </a:r>
+            <a:r>
+              <a:rPr lang="zh-CN" altLang="en-US" sz="2400" dirty="0" smtClean="0"/>
+              <a:t>静置</a:t>
+            </a:r>
+            <a:r>
+              <a:rPr lang="zh-CN" altLang="en-US" sz="2400" dirty="0"/>
+              <a:t>约</a:t>
+            </a:r>
+            <a:r>
+              <a:rPr lang="en-US" altLang="zh-CN" sz="2400" dirty="0"/>
+              <a:t>30</a:t>
+            </a:r>
+            <a:r>
+              <a:rPr lang="en-US" altLang="zh-CN" sz="2400" i="1" dirty="0"/>
+              <a:t>min</a:t>
+            </a:r>
+            <a:r>
+              <a:rPr lang="en-US" altLang="zh-CN" sz="2400" dirty="0"/>
+              <a:t>, </a:t>
+            </a:r>
+            <a:r>
+              <a:rPr lang="zh-CN" altLang="en-US" sz="2400" dirty="0"/>
+              <a:t>达到溶解平衡</a:t>
+            </a:r>
+            <a:r>
+              <a:rPr lang="en-US" altLang="zh-CN" sz="2400" dirty="0"/>
               <a:t>.</a:t>
             </a:r>
-            <a:r>
-              <a:rPr lang="en-US" altLang="zh-CN" sz="2400"/>
-              <a:t>1</a:t>
-            </a:r>
-            <a:r>
-              <a:rPr lang="en-US" altLang="zh-CN" sz="2400" i="1"/>
-              <a:t>mol/L</a:t>
-            </a:r>
-            <a:r>
-              <a:rPr lang="en-US" altLang="zh-CN" sz="2400" i="1" smtClean="0"/>
-              <a:t> </a:t>
+          </a:p>
+          <a:p>
+            <a:r>
+              <a:rPr lang="zh-CN" altLang="en-US" sz="2400" dirty="0" smtClean="0"/>
+              <a:t>测定</a:t>
+            </a:r>
+            <a:r>
+              <a:rPr lang="zh-CN" altLang="en-US" sz="2400" dirty="0"/>
+              <a:t>该温度下饱和</a:t>
             </a:r>
             <a:r>
               <a:rPr lang="en-US" altLang="zh-CN" sz="2400" i="1" dirty="0" err="1"/>
-              <a:t>KCl</a:t>
+              <a:t>AgCl</a:t>
             </a:r>
             <a:r>
               <a:rPr lang="en-US" altLang="zh-CN" sz="2400" i="1" dirty="0"/>
               <a:t> </a:t>
             </a:r>
             <a:r>
+              <a:rPr lang="zh-CN" altLang="en-US" sz="2400" dirty="0"/>
+              <a:t>溶液和电导水的电导率</a:t>
+            </a:r>
+            <a:r>
+              <a:rPr lang="en-US" altLang="zh-CN" sz="2400" dirty="0"/>
+              <a:t>.</a:t>
+            </a:r>
+          </a:p>
+          <a:p>
+            <a:r>
               <a:rPr lang="zh-CN" altLang="en-US" sz="2400" dirty="0" smtClean="0"/>
-              <a:t>溶液 </a:t>
-            </a:r>
-            <a:r>
-              <a:rPr lang="en-US" altLang="zh-CN" sz="2400" dirty="0" smtClean="0"/>
-              <a:t>(</a:t>
+              <a:t>重复</a:t>
             </a:r>
             <a:r>
               <a:rPr lang="zh-CN" altLang="en-US" sz="2400" dirty="0"/>
-              <a:t>边加边</a:t>
-            </a:r>
-            <a:r>
-              <a:rPr lang="zh-CN" altLang="en-US" sz="2400" dirty="0" smtClean="0"/>
-              <a:t>搅拌</a:t>
-            </a:r>
-            <a:r>
-              <a:rPr lang="en-US" altLang="zh-CN" sz="2400" dirty="0"/>
-              <a:t>).</a:t>
-            </a:r>
-          </a:p>
-          <a:p>
-            <a:r>
-              <a:rPr lang="zh-CN" altLang="en-US" sz="2400" dirty="0" smtClean="0"/>
-              <a:t>用</a:t>
-            </a:r>
-            <a:r>
-              <a:rPr lang="zh-CN" altLang="en-US" sz="2400" dirty="0"/>
-              <a:t>吸滤瓶过滤溶液</a:t>
+              <a:t>上述步骤</a:t>
             </a:r>
             <a:r>
               <a:rPr lang="en-US" altLang="zh-CN" sz="2400" dirty="0"/>
@@ -4680,15 +5720,59 @@
             </a:r>
             <a:r>
               <a:rPr lang="zh-CN" altLang="en-US" sz="2400" dirty="0"/>
-              <a:t>滴加电导水抽滤</a:t>
+              <a:t>继续测定</a:t>
             </a:r>
             <a:r>
               <a:rPr lang="en-US" altLang="zh-CN" sz="2400" dirty="0"/>
-              <a:t>3 </a:t>
+              <a:t>30</a:t>
+            </a:r>
+            <a:r>
+              <a:rPr lang="zh-CN" altLang="en-US" sz="2400" i="1" dirty="0"/>
+              <a:t>◦</a:t>
+            </a:r>
+            <a:r>
+              <a:rPr lang="en-US" altLang="zh-CN" sz="2400" dirty="0"/>
+              <a:t>C, 35</a:t>
+            </a:r>
+            <a:r>
+              <a:rPr lang="zh-CN" altLang="en-US" sz="2400" i="1" dirty="0"/>
+              <a:t>◦</a:t>
+            </a:r>
+            <a:r>
+              <a:rPr lang="en-US" altLang="zh-CN" sz="2400" dirty="0"/>
+              <a:t>C, 40</a:t>
+            </a:r>
+            <a:r>
+              <a:rPr lang="zh-CN" altLang="en-US" sz="2400" i="1" dirty="0"/>
+              <a:t>◦</a:t>
+            </a:r>
+            <a:r>
+              <a:rPr lang="en-US" altLang="zh-CN" sz="2400" dirty="0"/>
+              <a:t>C, 50</a:t>
+            </a:r>
+            <a:r>
+              <a:rPr lang="zh-CN" altLang="en-US" sz="2400" i="1" dirty="0"/>
+              <a:t>◦</a:t>
+            </a:r>
+            <a:r>
+              <a:rPr lang="en-US" altLang="zh-CN" sz="2400" dirty="0"/>
+              <a:t>C </a:t>
             </a:r>
             <a:r>
               <a:rPr lang="zh-CN" altLang="en-US" sz="2400" dirty="0"/>
-              <a:t>次</a:t>
+              <a:t>下饱和</a:t>
+            </a:r>
+            <a:r>
+              <a:rPr lang="en-US" altLang="zh-CN" sz="2400" i="1" dirty="0" err="1"/>
+              <a:t>AgCl</a:t>
+            </a:r>
+            <a:r>
+              <a:rPr lang="en-US" altLang="zh-CN" sz="2400" i="1" dirty="0"/>
+              <a:t> </a:t>
+            </a:r>
+            <a:r>
+              <a:rPr lang="zh-CN" altLang="en-US" sz="2400" dirty="0"/>
+              <a:t>溶液和电导水的电导率</a:t>
             </a:r>
             <a:r>
               <a:rPr lang="en-US" altLang="zh-CN" sz="2400" dirty="0"/>
@@ -4697,33 +5781,45 @@
           </a:p>
           <a:p>
             <a:r>
+              <a:rPr lang="zh-CN" altLang="en-US" sz="2400" dirty="0"/>
+              <a:t>将</a:t>
+            </a:r>
+            <a:r>
               <a:rPr lang="zh-CN" altLang="en-US" sz="2400" dirty="0" smtClean="0"/>
-              <a:t>称量</a:t>
+              <a:t>电导</a:t>
             </a:r>
             <a:r>
               <a:rPr lang="zh-CN" altLang="en-US" sz="2400" dirty="0"/>
-              <a:t>制得的白色固体</a:t>
-            </a:r>
-            <a:r>
-              <a:rPr lang="en-US" altLang="zh-CN" sz="2400" dirty="0"/>
-              <a:t>, </a:t>
+              <a:t>法测量的</a:t>
+            </a:r>
+            <a:r>
+              <a:rPr lang="en-US" altLang="zh-CN" sz="2400" i="1" dirty="0" err="1"/>
+              <a:t>AgCl</a:t>
+            </a:r>
+            <a:r>
+              <a:rPr lang="en-US" altLang="zh-CN" sz="2400" i="1" dirty="0"/>
+              <a:t> </a:t>
             </a:r>
             <a:r>
               <a:rPr lang="zh-CN" altLang="en-US" sz="2400" dirty="0"/>
-              <a:t>并将其保存在棕色试剂瓶中或立即使用</a:t>
+              <a:t>溶度积可与电动势测定实验中的值进行对比</a:t>
             </a:r>
             <a:r>
               <a:rPr lang="en-US" altLang="zh-CN" sz="2400" dirty="0"/>
               <a:t>.</a:t>
             </a:r>
-            <a:endParaRPr lang="zh-CN" altLang="en-US" sz="2400" dirty="0"/>
+            <a:endParaRPr lang="zh-CN" altLang="en-US" sz="2400" dirty="0">
+              <a:solidFill>
+                <a:schemeClr val="tx1"/>
+              </a:solidFill>
+            </a:endParaRPr>
           </a:p>
         </p:txBody>
       </p:sp>
     </p:spTree>
     <p:extLst>
       <p:ext uri="{BB962C8B-B14F-4D97-AF65-F5344CB8AC3E}">
-        <p14:creationId xmlns:p14="http://schemas.microsoft.com/office/powerpoint/2010/main" val="1749368024"/>
+        <p14:creationId xmlns:p14="http://schemas.microsoft.com/office/powerpoint/2010/main" val="805874841"/>
       </p:ext>
     </p:extLst>
   </p:cSld>
@@ -4733,7 +5829,7 @@
 </p:sld>
 </file>
 
-<file path=ppt/slides/slide5.xml><?xml version="1.0" encoding="utf-8"?>
+<file path=ppt/slides/slide8.xml><?xml version="1.0" encoding="utf-8"?>
 <p:sld xmlns:a="http://schemas.openxmlformats.org/drawingml/2006/main" xmlns:r="http://schemas.openxmlformats.org/officeDocument/2006/relationships" xmlns:p="http://schemas.openxmlformats.org/presentationml/2006/main">
   <p:cSld>
     <p:spTree>
@@ -4762,7 +5858,7 @@
             </p:custDataLst>
             <p:extLst>
               <p:ext uri="{D42A27DB-BD31-4B8C-83A1-F6EECF244321}">
-                <p14:modId xmlns:p14="http://schemas.microsoft.com/office/powerpoint/2010/main" val="2671962530"/>
+                <p14:modId xmlns:p14="http://schemas.microsoft.com/office/powerpoint/2010/main" val="2739515135"/>
               </p:ext>
             </p:extLst>
           </p:nvPr>
@@ -4775,7 +5871,7 @@
           <a:graphicData uri="http://schemas.openxmlformats.org/presentationml/2006/ole">
             <mc:AlternateContent xmlns:mc="http://schemas.openxmlformats.org/markup-compatibility/2006">
               <mc:Choice xmlns:v="urn:schemas-microsoft-com:vml" Requires="v">
-                <p:oleObj spid="_x0000_s4116" name="think-cell Slide" r:id="rId4" imgW="395" imgH="392" progId="TCLayout.ActiveDocument.1">
+                <p:oleObj spid="_x0000_s9222" name="think-cell Slide" r:id="rId4" imgW="395" imgH="392" progId="TCLayout.ActiveDocument.1">
                   <p:embed/>
                 </p:oleObj>
               </mc:Choice>
@@ -4822,302 +5918,42 @@
         </p:nvSpPr>
         <p:spPr/>
         <p:txBody>
-          <a:bodyPr/>
-          <a:lstStyle/>
-          <a:p>
-            <a:r>
-              <a:rPr lang="zh-CN" altLang="en-US" sz="2400" dirty="0"/>
-              <a:t>实验方案</a:t>
-            </a:r>
-            <a:r>
-              <a:rPr lang="en-US" altLang="zh-CN" sz="2400" dirty="0"/>
-              <a:t/>
-            </a:r>
-            <a:br>
-              <a:rPr lang="en-US" altLang="zh-CN" sz="2400" dirty="0"/>
-            </a:br>
-            <a:r>
-              <a:rPr lang="en-US" altLang="zh-CN" sz="2400" dirty="0"/>
-              <a:t/>
-            </a:r>
-            <a:br>
-              <a:rPr lang="en-US" altLang="zh-CN" sz="2400" dirty="0"/>
-            </a:br>
-            <a:r>
-              <a:rPr lang="zh-CN" altLang="en-US" b="1" dirty="0" smtClean="0"/>
-              <a:t>电导率测定</a:t>
-            </a:r>
-            <a:endParaRPr lang="zh-CN" altLang="en-US" dirty="0"/>
-          </a:p>
-        </p:txBody>
-      </p:sp>
-      <p:sp>
-        <p:nvSpPr>
-          <p:cNvPr id="3" name="内容占位符 2"/>
-          <p:cNvSpPr>
-            <a:spLocks noGrp="1"/>
-          </p:cNvSpPr>
-          <p:nvPr>
-            <p:ph idx="1"/>
-          </p:nvPr>
-        </p:nvSpPr>
-        <p:spPr/>
-        <p:txBody>
           <a:bodyPr>
             <a:normAutofit/>
           </a:bodyPr>
           <a:lstStyle/>
           <a:p>
             <a:r>
-              <a:rPr lang="zh-CN" altLang="en-US" sz="2400" dirty="0"/>
-              <a:t>取少量新制的</a:t>
-            </a:r>
-            <a:r>
-              <a:rPr lang="en-US" altLang="zh-CN" sz="2400" i="1" dirty="0" err="1"/>
-              <a:t>AgCl</a:t>
-            </a:r>
-            <a:r>
-              <a:rPr lang="en-US" altLang="zh-CN" sz="2400" i="1" dirty="0"/>
-              <a:t> </a:t>
-            </a:r>
-            <a:r>
-              <a:rPr lang="zh-CN" altLang="en-US" sz="2400" dirty="0"/>
-              <a:t>固体溶解在</a:t>
-            </a:r>
-            <a:r>
-              <a:rPr lang="en-US" altLang="zh-CN" sz="2400" dirty="0"/>
-              <a:t>50</a:t>
-            </a:r>
-            <a:r>
-              <a:rPr lang="en-US" altLang="zh-CN" sz="2400" i="1" dirty="0"/>
-              <a:t>mL </a:t>
-            </a:r>
-            <a:r>
-              <a:rPr lang="zh-CN" altLang="en-US" sz="2400" dirty="0"/>
-              <a:t>烧杯中</a:t>
-            </a:r>
-            <a:r>
-              <a:rPr lang="en-US" altLang="zh-CN" sz="2400" dirty="0"/>
-              <a:t>, </a:t>
-            </a:r>
-            <a:r>
-              <a:rPr lang="zh-CN" altLang="en-US" sz="2400" dirty="0"/>
-              <a:t>加入</a:t>
-            </a:r>
-            <a:r>
-              <a:rPr lang="en-US" altLang="zh-CN" sz="2400" dirty="0"/>
-              <a:t>20</a:t>
-            </a:r>
-            <a:r>
-              <a:rPr lang="en-US" altLang="zh-CN" sz="2400" i="1" dirty="0"/>
-              <a:t>mL </a:t>
-            </a:r>
-            <a:r>
-              <a:rPr lang="zh-CN" altLang="en-US" sz="2400" dirty="0"/>
-              <a:t>电导水</a:t>
-            </a:r>
-            <a:r>
-              <a:rPr lang="en-US" altLang="zh-CN" sz="2400" dirty="0"/>
-              <a:t>, </a:t>
-            </a:r>
-            <a:r>
-              <a:rPr lang="zh-CN" altLang="en-US" sz="2400" dirty="0"/>
-              <a:t>搅拌</a:t>
-            </a:r>
-            <a:r>
-              <a:rPr lang="en-US" altLang="zh-CN" sz="2400" dirty="0"/>
-              <a:t>, </a:t>
-            </a:r>
-            <a:r>
-              <a:rPr lang="zh-CN" altLang="en-US" sz="2400" dirty="0"/>
-              <a:t>在</a:t>
-            </a:r>
-            <a:r>
-              <a:rPr lang="en-US" altLang="zh-CN" sz="2400" dirty="0"/>
-              <a:t>25</a:t>
-            </a:r>
-            <a:r>
-              <a:rPr lang="zh-CN" altLang="en-US" sz="2400" i="1" dirty="0"/>
-              <a:t>◦</a:t>
-            </a:r>
-            <a:r>
-              <a:rPr lang="en-US" altLang="zh-CN" sz="2400" dirty="0"/>
-              <a:t>C </a:t>
-            </a:r>
-            <a:r>
-              <a:rPr lang="zh-CN" altLang="en-US" sz="2400" dirty="0"/>
-              <a:t>恒温槽中</a:t>
-            </a:r>
-            <a:r>
-              <a:rPr lang="zh-CN" altLang="en-US" sz="2400" dirty="0" smtClean="0"/>
-              <a:t>静置</a:t>
-            </a:r>
-            <a:r>
-              <a:rPr lang="zh-CN" altLang="en-US" sz="2400" dirty="0"/>
-              <a:t>约</a:t>
-            </a:r>
-            <a:r>
-              <a:rPr lang="en-US" altLang="zh-CN" sz="2400" dirty="0"/>
-              <a:t>30</a:t>
-            </a:r>
-            <a:r>
-              <a:rPr lang="en-US" altLang="zh-CN" sz="2400" i="1" dirty="0"/>
-              <a:t>min</a:t>
-            </a:r>
-            <a:r>
-              <a:rPr lang="en-US" altLang="zh-CN" sz="2400" dirty="0"/>
-              <a:t>, </a:t>
-            </a:r>
-            <a:r>
-              <a:rPr lang="zh-CN" altLang="en-US" sz="2400" dirty="0"/>
-              <a:t>达到溶解平衡</a:t>
-            </a:r>
-            <a:r>
-              <a:rPr lang="en-US" altLang="zh-CN" sz="2400" dirty="0"/>
-              <a:t>.</a:t>
-            </a:r>
-          </a:p>
-          <a:p>
-            <a:r>
-              <a:rPr lang="zh-CN" altLang="en-US" sz="2400" dirty="0" smtClean="0"/>
-              <a:t>测定</a:t>
-            </a:r>
-            <a:r>
-              <a:rPr lang="zh-CN" altLang="en-US" sz="2400" dirty="0"/>
-              <a:t>该温度下饱和</a:t>
-            </a:r>
-            <a:r>
-              <a:rPr lang="en-US" altLang="zh-CN" sz="2400" i="1" dirty="0" err="1"/>
-              <a:t>AgCl</a:t>
-            </a:r>
-            <a:r>
-              <a:rPr lang="en-US" altLang="zh-CN" sz="2400" i="1" dirty="0"/>
-              <a:t> </a:t>
-            </a:r>
-            <a:r>
-              <a:rPr lang="zh-CN" altLang="en-US" sz="2400" dirty="0"/>
-              <a:t>溶液和电导水的电导率</a:t>
-            </a:r>
-            <a:r>
-              <a:rPr lang="en-US" altLang="zh-CN" sz="2400" dirty="0"/>
-              <a:t>.</a:t>
-            </a:r>
-          </a:p>
-          <a:p>
-            <a:r>
-              <a:rPr lang="zh-CN" altLang="en-US" sz="2400" dirty="0" smtClean="0"/>
-              <a:t>重复</a:t>
-            </a:r>
-            <a:r>
-              <a:rPr lang="zh-CN" altLang="en-US" sz="2400" dirty="0"/>
-              <a:t>上述步骤</a:t>
-            </a:r>
-            <a:r>
-              <a:rPr lang="en-US" altLang="zh-CN" sz="2400" dirty="0"/>
-              <a:t>, </a:t>
-            </a:r>
-            <a:r>
-              <a:rPr lang="zh-CN" altLang="en-US" sz="2400" dirty="0"/>
-              <a:t>继续测定</a:t>
-            </a:r>
-            <a:r>
-              <a:rPr lang="en-US" altLang="zh-CN" sz="2400" dirty="0"/>
-              <a:t>30</a:t>
-            </a:r>
-            <a:r>
-              <a:rPr lang="zh-CN" altLang="en-US" sz="2400" i="1" dirty="0"/>
-              <a:t>◦</a:t>
-            </a:r>
-            <a:r>
-              <a:rPr lang="en-US" altLang="zh-CN" sz="2400" dirty="0"/>
-              <a:t>C, 35</a:t>
-            </a:r>
-            <a:r>
-              <a:rPr lang="zh-CN" altLang="en-US" sz="2400" i="1" dirty="0"/>
-              <a:t>◦</a:t>
-            </a:r>
-            <a:r>
-              <a:rPr lang="en-US" altLang="zh-CN" sz="2400" dirty="0"/>
-              <a:t>C, 40</a:t>
-            </a:r>
-            <a:r>
-              <a:rPr lang="zh-CN" altLang="en-US" sz="2400" i="1" dirty="0"/>
-              <a:t>◦</a:t>
-            </a:r>
-            <a:r>
-              <a:rPr lang="en-US" altLang="zh-CN" sz="2400" dirty="0"/>
-              <a:t>C, 50</a:t>
-            </a:r>
-            <a:r>
-              <a:rPr lang="zh-CN" altLang="en-US" sz="2400" i="1" dirty="0"/>
-              <a:t>◦</a:t>
-            </a:r>
-            <a:r>
-              <a:rPr lang="en-US" altLang="zh-CN" sz="2400" dirty="0"/>
-              <a:t>C </a:t>
-            </a:r>
-            <a:r>
-              <a:rPr lang="zh-CN" altLang="en-US" sz="2400" dirty="0"/>
-              <a:t>下饱和</a:t>
-            </a:r>
-            <a:r>
-              <a:rPr lang="en-US" altLang="zh-CN" sz="2400" i="1" dirty="0" err="1"/>
-              <a:t>AgCl</a:t>
-            </a:r>
-            <a:r>
-              <a:rPr lang="en-US" altLang="zh-CN" sz="2400" i="1" dirty="0"/>
-              <a:t> </a:t>
-            </a:r>
-            <a:r>
-              <a:rPr lang="zh-CN" altLang="en-US" sz="2400" dirty="0"/>
-              <a:t>溶液和电导水的电导率</a:t>
-            </a:r>
-            <a:r>
-              <a:rPr lang="en-US" altLang="zh-CN" sz="2400" dirty="0"/>
-              <a:t>.</a:t>
-            </a:r>
-          </a:p>
-          <a:p>
-            <a:r>
-              <a:rPr lang="zh-CN" altLang="en-US" sz="2400" dirty="0"/>
-              <a:t>将</a:t>
-            </a:r>
-            <a:r>
-              <a:rPr lang="zh-CN" altLang="en-US" sz="2400" dirty="0" smtClean="0"/>
-              <a:t>电导</a:t>
-            </a:r>
-            <a:r>
-              <a:rPr lang="zh-CN" altLang="en-US" sz="2400" dirty="0"/>
-              <a:t>法测量的</a:t>
-            </a:r>
-            <a:r>
-              <a:rPr lang="en-US" altLang="zh-CN" sz="2400" i="1" dirty="0" err="1"/>
-              <a:t>AgCl</a:t>
-            </a:r>
-            <a:r>
-              <a:rPr lang="en-US" altLang="zh-CN" sz="2400" i="1" dirty="0"/>
-              <a:t> </a:t>
-            </a:r>
-            <a:r>
-              <a:rPr lang="zh-CN" altLang="en-US" sz="2400" dirty="0"/>
-              <a:t>溶度积可与电动势测定实验中的值进行对比</a:t>
-            </a:r>
-            <a:r>
-              <a:rPr lang="en-US" altLang="zh-CN" sz="2400" dirty="0"/>
-              <a:t>.</a:t>
-            </a:r>
-            <a:endParaRPr lang="zh-CN" altLang="en-US" sz="2400" dirty="0">
-              <a:solidFill>
-                <a:schemeClr val="tx1"/>
-              </a:solidFill>
-            </a:endParaRPr>
+              <a:rPr lang="zh-CN" altLang="en-US" sz="2800" b="1" dirty="0" smtClean="0"/>
+              <a:t>讨论</a:t>
+            </a:r>
+            <a:endParaRPr lang="zh-CN" altLang="en-US" sz="2800" b="1" dirty="0"/>
+          </a:p>
+        </p:txBody>
+      </p:sp>
+      <p:sp>
+        <p:nvSpPr>
+          <p:cNvPr id="3" name="内容占位符 2"/>
+          <p:cNvSpPr>
+            <a:spLocks noGrp="1"/>
+          </p:cNvSpPr>
+          <p:nvPr>
+            <p:ph idx="1"/>
+          </p:nvPr>
+        </p:nvSpPr>
+        <p:spPr/>
+        <p:txBody>
+          <a:bodyPr/>
+          <a:lstStyle/>
+          <a:p>
+            <a:endParaRPr lang="zh-CN" altLang="en-US"/>
           </a:p>
         </p:txBody>
       </p:sp>
     </p:spTree>
     <p:extLst>
       <p:ext uri="{BB962C8B-B14F-4D97-AF65-F5344CB8AC3E}">
-        <p14:creationId xmlns:p14="http://schemas.microsoft.com/office/powerpoint/2010/main" val="805874841"/>
+        <p14:creationId xmlns:p14="http://schemas.microsoft.com/office/powerpoint/2010/main" val="3183141414"/>
       </p:ext>
     </p:extLst>
   </p:cSld>
@@ -5127,7 +5963,7 @@
 </p:sld>
 </file>
 
-<file path=ppt/slides/slide6.xml><?xml version="1.0" encoding="utf-8"?>
+<file path=ppt/slides/slide9.xml><?xml version="1.0" encoding="utf-8"?>
 <p:sld xmlns:a="http://schemas.openxmlformats.org/drawingml/2006/main" xmlns:r="http://schemas.openxmlformats.org/officeDocument/2006/relationships" xmlns:p="http://schemas.openxmlformats.org/presentationml/2006/main">
   <p:cSld>
     <p:spTree>
@@ -5218,6 +6054,30 @@
 <file path=ppt/tags/tag1.xml><?xml version="1.0" encoding="utf-8"?>
 <p:tagLst xmlns:a="http://schemas.openxmlformats.org/drawingml/2006/main" xmlns:r="http://schemas.openxmlformats.org/officeDocument/2006/relationships" xmlns:p="http://schemas.openxmlformats.org/presentationml/2006/main">
   <p:tag name="THINKCELLUNDODONOTDELETE" val="0"/>
+</p:tagLst>
+</file>
+
+<file path=ppt/tags/tag10.xml><?xml version="1.0" encoding="utf-8"?>
+<p:tagLst xmlns:a="http://schemas.openxmlformats.org/drawingml/2006/main" xmlns:r="http://schemas.openxmlformats.org/officeDocument/2006/relationships" xmlns:p="http://schemas.openxmlformats.org/presentationml/2006/main">
+  <p:tag name="THINKCELLSHAPEDONOTDELETE" val="thinkcellActiveDocDoNotDelete"/>
+</p:tagLst>
+</file>
+
+<file path=ppt/tags/tag11.xml><?xml version="1.0" encoding="utf-8"?>
+<p:tagLst xmlns:a="http://schemas.openxmlformats.org/drawingml/2006/main" xmlns:r="http://schemas.openxmlformats.org/officeDocument/2006/relationships" xmlns:p="http://schemas.openxmlformats.org/presentationml/2006/main">
+  <p:tag name="THINKCELLSHAPEDONOTDELETE" val="thinkcellActiveDocDoNotDelete"/>
+</p:tagLst>
+</file>
+
+<file path=ppt/tags/tag12.xml><?xml version="1.0" encoding="utf-8"?>
+<p:tagLst xmlns:a="http://schemas.openxmlformats.org/drawingml/2006/main" xmlns:r="http://schemas.openxmlformats.org/officeDocument/2006/relationships" xmlns:p="http://schemas.openxmlformats.org/presentationml/2006/main">
+  <p:tag name="THINKCELLSHAPEDONOTDELETE" val="thinkcellActiveDocDoNotDelete"/>
+</p:tagLst>
+</file>
+
+<file path=ppt/tags/tag13.xml><?xml version="1.0" encoding="utf-8"?>
+<p:tagLst xmlns:a="http://schemas.openxmlformats.org/drawingml/2006/main" xmlns:r="http://schemas.openxmlformats.org/officeDocument/2006/relationships" xmlns:p="http://schemas.openxmlformats.org/presentationml/2006/main">
+  <p:tag name="THINKCELLSHAPEDONOTDELETE" val="thinkcellActiveDocDoNotDelete"/>
 </p:tagLst>
 </file>
 
@@ -5241,7 +6101,7 @@
 
 <file path=ppt/tags/tag5.xml><?xml version="1.0" encoding="utf-8"?>
 <p:tagLst xmlns:a="http://schemas.openxmlformats.org/drawingml/2006/main" xmlns:r="http://schemas.openxmlformats.org/officeDocument/2006/relationships" xmlns:p="http://schemas.openxmlformats.org/presentationml/2006/main">
-  <p:tag name="THINKCELLSHAPEDONOTDELETE" val="thinkcellActiveDocDoNotDelete"/>
+  <p:tag name="THINKCELLSHAPEDONOTDELETE" val="tErsL8jwvRR.TZrqtgtjfYw"/>
 </p:tagLst>
 </file>
 
@@ -5253,7 +6113,19 @@
 
 <file path=ppt/tags/tag7.xml><?xml version="1.0" encoding="utf-8"?>
 <p:tagLst xmlns:a="http://schemas.openxmlformats.org/drawingml/2006/main" xmlns:r="http://schemas.openxmlformats.org/officeDocument/2006/relationships" xmlns:p="http://schemas.openxmlformats.org/presentationml/2006/main">
+  <p:tag name="THINKCELLSHAPEDONOTDELETE" val="trKi5j34dT56ngOyO1jYZAQ"/>
+</p:tagLst>
+</file>
+
+<file path=ppt/tags/tag8.xml><?xml version="1.0" encoding="utf-8"?>
+<p:tagLst xmlns:a="http://schemas.openxmlformats.org/drawingml/2006/main" xmlns:r="http://schemas.openxmlformats.org/officeDocument/2006/relationships" xmlns:p="http://schemas.openxmlformats.org/presentationml/2006/main">
   <p:tag name="THINKCELLSHAPEDONOTDELETE" val="thinkcellActiveDocDoNotDelete"/>
+</p:tagLst>
+</file>
+
+<file path=ppt/tags/tag9.xml><?xml version="1.0" encoding="utf-8"?>
+<p:tagLst xmlns:a="http://schemas.openxmlformats.org/drawingml/2006/main" xmlns:r="http://schemas.openxmlformats.org/officeDocument/2006/relationships" xmlns:p="http://schemas.openxmlformats.org/presentationml/2006/main">
+  <p:tag name="THINKCELLSHAPEDONOTDELETE" val="t0D1XY_TKTkS5Wt26Vx0LGQ"/>
 </p:tagLst>
 </file>
 

</xml_diff>